<commit_message>
update analytical solution analysis table and figures
</commit_message>
<xml_diff>
--- a/ParamSpaceFigures.pptx
+++ b/ParamSpaceFigures.pptx
@@ -107,7 +107,192 @@
       </a:defRPr>
     </a:lvl9pPr>
   </p:defaultTextStyle>
+  <p:extLst>
+    <p:ext uri="{EFAFB233-063F-42B5-8137-9DF3F51BA10A}">
+      <p15:sldGuideLst xmlns:p15="http://schemas.microsoft.com/office/powerpoint/2012/main"/>
+    </p:ext>
+  </p:extLst>
 </p:presentation>
+</file>
+
+<file path=ppt/revisionInfo.xml><?xml version="1.0" encoding="utf-8"?>
+<p1510:revInfo xmlns:a="http://schemas.openxmlformats.org/drawingml/2006/main" xmlns:r="http://schemas.openxmlformats.org/officeDocument/2006/relationships" xmlns:p1510="http://schemas.microsoft.com/office/powerpoint/2015/10/main">
+  <p1510:revLst>
+    <p1510:client id="{CBC2BE33-CB9D-4F41-A069-55FBA2E3D275}" v="3" dt="2020-11-02T05:55:32.716"/>
+  </p1510:revLst>
+</p1510:revInfo>
+</file>
+
+<file path=ppt/changesInfos/changesInfo1.xml><?xml version="1.0" encoding="utf-8"?>
+<pc:chgInfo xmlns:a="http://schemas.openxmlformats.org/drawingml/2006/main" xmlns:r="http://schemas.openxmlformats.org/officeDocument/2006/relationships" xmlns:ac="http://schemas.microsoft.com/office/drawing/2013/main/command" xmlns:pc="http://schemas.microsoft.com/office/powerpoint/2013/main/command">
+  <pc:docChgLst>
+    <pc:chgData name="Desautels Israel Study Trip" userId="b164cf87-9e27-483d-96be-d558d6a89ad0" providerId="ADAL" clId="{CBC2BE33-CB9D-4F41-A069-55FBA2E3D275}"/>
+    <pc:docChg chg="undo custSel modSld">
+      <pc:chgData name="Desautels Israel Study Trip" userId="b164cf87-9e27-483d-96be-d558d6a89ad0" providerId="ADAL" clId="{CBC2BE33-CB9D-4F41-A069-55FBA2E3D275}" dt="2020-11-02T05:56:50.251" v="381" actId="1036"/>
+      <pc:docMkLst>
+        <pc:docMk/>
+      </pc:docMkLst>
+      <pc:sldChg chg="addSp delSp modSp">
+        <pc:chgData name="Desautels Israel Study Trip" userId="b164cf87-9e27-483d-96be-d558d6a89ad0" providerId="ADAL" clId="{CBC2BE33-CB9D-4F41-A069-55FBA2E3D275}" dt="2020-11-02T05:56:50.251" v="381" actId="1036"/>
+        <pc:sldMkLst>
+          <pc:docMk/>
+          <pc:sldMk cId="2110773135" sldId="257"/>
+        </pc:sldMkLst>
+        <pc:spChg chg="mod">
+          <ac:chgData name="Desautels Israel Study Trip" userId="b164cf87-9e27-483d-96be-d558d6a89ad0" providerId="ADAL" clId="{CBC2BE33-CB9D-4F41-A069-55FBA2E3D275}" dt="2020-11-02T05:56:50.251" v="381" actId="1036"/>
+          <ac:spMkLst>
+            <pc:docMk/>
+            <pc:sldMk cId="2110773135" sldId="257"/>
+            <ac:spMk id="52" creationId="{BB553178-3D24-4B0E-A44A-E48747E9370E}"/>
+          </ac:spMkLst>
+        </pc:spChg>
+        <pc:picChg chg="add mod modCrop">
+          <ac:chgData name="Desautels Israel Study Trip" userId="b164cf87-9e27-483d-96be-d558d6a89ad0" providerId="ADAL" clId="{CBC2BE33-CB9D-4F41-A069-55FBA2E3D275}" dt="2020-11-02T05:56:42.254" v="361" actId="1036"/>
+          <ac:picMkLst>
+            <pc:docMk/>
+            <pc:sldMk cId="2110773135" sldId="257"/>
+            <ac:picMk id="3" creationId="{ED1D9CD6-78FE-4AA5-99CA-9ED10487F6A5}"/>
+          </ac:picMkLst>
+        </pc:picChg>
+        <pc:picChg chg="del mod">
+          <ac:chgData name="Desautels Israel Study Trip" userId="b164cf87-9e27-483d-96be-d558d6a89ad0" providerId="ADAL" clId="{CBC2BE33-CB9D-4F41-A069-55FBA2E3D275}" dt="2020-11-02T05:55:14.820" v="298" actId="478"/>
+          <ac:picMkLst>
+            <pc:docMk/>
+            <pc:sldMk cId="2110773135" sldId="257"/>
+            <ac:picMk id="55" creationId="{6CA0B692-E00A-4D4C-A789-3D8A3B7C4B64}"/>
+          </ac:picMkLst>
+        </pc:picChg>
+      </pc:sldChg>
+      <pc:sldChg chg="addSp delSp modSp">
+        <pc:chgData name="Desautels Israel Study Trip" userId="b164cf87-9e27-483d-96be-d558d6a89ad0" providerId="ADAL" clId="{CBC2BE33-CB9D-4F41-A069-55FBA2E3D275}" dt="2020-11-02T05:55:09.133" v="296" actId="1035"/>
+        <pc:sldMkLst>
+          <pc:docMk/>
+          <pc:sldMk cId="1151188242" sldId="259"/>
+        </pc:sldMkLst>
+        <pc:spChg chg="mod">
+          <ac:chgData name="Desautels Israel Study Trip" userId="b164cf87-9e27-483d-96be-d558d6a89ad0" providerId="ADAL" clId="{CBC2BE33-CB9D-4F41-A069-55FBA2E3D275}" dt="2020-11-02T05:53:11.792" v="85" actId="1035"/>
+          <ac:spMkLst>
+            <pc:docMk/>
+            <pc:sldMk cId="1151188242" sldId="259"/>
+            <ac:spMk id="49" creationId="{7C01DCA1-8815-472B-A822-DF545939D263}"/>
+          </ac:spMkLst>
+        </pc:spChg>
+        <pc:spChg chg="mod">
+          <ac:chgData name="Desautels Israel Study Trip" userId="b164cf87-9e27-483d-96be-d558d6a89ad0" providerId="ADAL" clId="{CBC2BE33-CB9D-4F41-A069-55FBA2E3D275}" dt="2020-11-02T05:53:51.282" v="166" actId="20577"/>
+          <ac:spMkLst>
+            <pc:docMk/>
+            <pc:sldMk cId="1151188242" sldId="259"/>
+            <ac:spMk id="52" creationId="{DA048C9A-6420-46A7-A11D-63136774BEF3}"/>
+          </ac:spMkLst>
+        </pc:spChg>
+        <pc:grpChg chg="mod">
+          <ac:chgData name="Desautels Israel Study Trip" userId="b164cf87-9e27-483d-96be-d558d6a89ad0" providerId="ADAL" clId="{CBC2BE33-CB9D-4F41-A069-55FBA2E3D275}" dt="2020-11-02T05:54:35.384" v="250" actId="1037"/>
+          <ac:grpSpMkLst>
+            <pc:docMk/>
+            <pc:sldMk cId="1151188242" sldId="259"/>
+            <ac:grpSpMk id="10" creationId="{D8C28C92-9452-451E-8558-2920121C5855}"/>
+          </ac:grpSpMkLst>
+        </pc:grpChg>
+        <pc:grpChg chg="mod">
+          <ac:chgData name="Desautels Israel Study Trip" userId="b164cf87-9e27-483d-96be-d558d6a89ad0" providerId="ADAL" clId="{CBC2BE33-CB9D-4F41-A069-55FBA2E3D275}" dt="2020-11-02T05:54:35.384" v="250" actId="1037"/>
+          <ac:grpSpMkLst>
+            <pc:docMk/>
+            <pc:sldMk cId="1151188242" sldId="259"/>
+            <ac:grpSpMk id="23" creationId="{6AFB9536-D78B-4FBC-8ABD-F98923F0A21E}"/>
+          </ac:grpSpMkLst>
+        </pc:grpChg>
+        <pc:grpChg chg="mod">
+          <ac:chgData name="Desautels Israel Study Trip" userId="b164cf87-9e27-483d-96be-d558d6a89ad0" providerId="ADAL" clId="{CBC2BE33-CB9D-4F41-A069-55FBA2E3D275}" dt="2020-11-02T05:54:35.384" v="250" actId="1037"/>
+          <ac:grpSpMkLst>
+            <pc:docMk/>
+            <pc:sldMk cId="1151188242" sldId="259"/>
+            <ac:grpSpMk id="26" creationId="{8364274B-D191-4150-93D2-91EB529E7EF0}"/>
+          </ac:grpSpMkLst>
+        </pc:grpChg>
+        <pc:grpChg chg="mod">
+          <ac:chgData name="Desautels Israel Study Trip" userId="b164cf87-9e27-483d-96be-d558d6a89ad0" providerId="ADAL" clId="{CBC2BE33-CB9D-4F41-A069-55FBA2E3D275}" dt="2020-11-02T05:54:35.384" v="250" actId="1037"/>
+          <ac:grpSpMkLst>
+            <pc:docMk/>
+            <pc:sldMk cId="1151188242" sldId="259"/>
+            <ac:grpSpMk id="29" creationId="{C46B9191-26A0-4FD4-8738-9A12E94157A1}"/>
+          </ac:grpSpMkLst>
+        </pc:grpChg>
+        <pc:grpChg chg="mod">
+          <ac:chgData name="Desautels Israel Study Trip" userId="b164cf87-9e27-483d-96be-d558d6a89ad0" providerId="ADAL" clId="{CBC2BE33-CB9D-4F41-A069-55FBA2E3D275}" dt="2020-11-02T05:54:35.384" v="250" actId="1037"/>
+          <ac:grpSpMkLst>
+            <pc:docMk/>
+            <pc:sldMk cId="1151188242" sldId="259"/>
+            <ac:grpSpMk id="32" creationId="{2D724FCC-F328-46BE-853A-8B1F7DBF66C8}"/>
+          </ac:grpSpMkLst>
+        </pc:grpChg>
+        <pc:grpChg chg="mod">
+          <ac:chgData name="Desautels Israel Study Trip" userId="b164cf87-9e27-483d-96be-d558d6a89ad0" providerId="ADAL" clId="{CBC2BE33-CB9D-4F41-A069-55FBA2E3D275}" dt="2020-11-02T05:55:09.133" v="296" actId="1035"/>
+          <ac:grpSpMkLst>
+            <pc:docMk/>
+            <pc:sldMk cId="1151188242" sldId="259"/>
+            <ac:grpSpMk id="35" creationId="{9B4497C7-68A9-4E10-827D-9E63FCDE88AF}"/>
+          </ac:grpSpMkLst>
+        </pc:grpChg>
+        <pc:grpChg chg="mod">
+          <ac:chgData name="Desautels Israel Study Trip" userId="b164cf87-9e27-483d-96be-d558d6a89ad0" providerId="ADAL" clId="{CBC2BE33-CB9D-4F41-A069-55FBA2E3D275}" dt="2020-11-02T05:55:03.817" v="287" actId="1036"/>
+          <ac:grpSpMkLst>
+            <pc:docMk/>
+            <pc:sldMk cId="1151188242" sldId="259"/>
+            <ac:grpSpMk id="38" creationId="{02542708-3527-4892-9EB9-3D1DC10CF8F6}"/>
+          </ac:grpSpMkLst>
+        </pc:grpChg>
+        <pc:grpChg chg="mod">
+          <ac:chgData name="Desautels Israel Study Trip" userId="b164cf87-9e27-483d-96be-d558d6a89ad0" providerId="ADAL" clId="{CBC2BE33-CB9D-4F41-A069-55FBA2E3D275}" dt="2020-11-02T05:54:35.384" v="250" actId="1037"/>
+          <ac:grpSpMkLst>
+            <pc:docMk/>
+            <pc:sldMk cId="1151188242" sldId="259"/>
+            <ac:grpSpMk id="41" creationId="{4265FAD0-2EA2-4245-BDDD-94FFA1396B7D}"/>
+          </ac:grpSpMkLst>
+        </pc:grpChg>
+        <pc:grpChg chg="mod">
+          <ac:chgData name="Desautels Israel Study Trip" userId="b164cf87-9e27-483d-96be-d558d6a89ad0" providerId="ADAL" clId="{CBC2BE33-CB9D-4F41-A069-55FBA2E3D275}" dt="2020-11-02T05:54:54.393" v="272" actId="1036"/>
+          <ac:grpSpMkLst>
+            <pc:docMk/>
+            <pc:sldMk cId="1151188242" sldId="259"/>
+            <ac:grpSpMk id="44" creationId="{B25B2F95-B085-476D-BD8A-E7E7AA0F9901}"/>
+          </ac:grpSpMkLst>
+        </pc:grpChg>
+        <pc:grpChg chg="mod">
+          <ac:chgData name="Desautels Israel Study Trip" userId="b164cf87-9e27-483d-96be-d558d6a89ad0" providerId="ADAL" clId="{CBC2BE33-CB9D-4F41-A069-55FBA2E3D275}" dt="2020-11-02T05:54:46.499" v="261" actId="1035"/>
+          <ac:grpSpMkLst>
+            <pc:docMk/>
+            <pc:sldMk cId="1151188242" sldId="259"/>
+            <ac:grpSpMk id="47" creationId="{CC3A66A7-5D30-4E03-8418-F2A4E6B64888}"/>
+          </ac:grpSpMkLst>
+        </pc:grpChg>
+        <pc:grpChg chg="add mod">
+          <ac:chgData name="Desautels Israel Study Trip" userId="b164cf87-9e27-483d-96be-d558d6a89ad0" providerId="ADAL" clId="{CBC2BE33-CB9D-4F41-A069-55FBA2E3D275}" dt="2020-11-02T05:54:35.384" v="250" actId="1037"/>
+          <ac:grpSpMkLst>
+            <pc:docMk/>
+            <pc:sldMk cId="1151188242" sldId="259"/>
+            <ac:grpSpMk id="50" creationId="{1009C8FE-6B48-4BE9-984A-4AF6BBBF44BD}"/>
+          </ac:grpSpMkLst>
+        </pc:grpChg>
+        <pc:picChg chg="del">
+          <ac:chgData name="Desautels Israel Study Trip" userId="b164cf87-9e27-483d-96be-d558d6a89ad0" providerId="ADAL" clId="{CBC2BE33-CB9D-4F41-A069-55FBA2E3D275}" dt="2020-11-02T05:49:20.411" v="0" actId="478"/>
+          <ac:picMkLst>
+            <pc:docMk/>
+            <pc:sldMk cId="1151188242" sldId="259"/>
+            <ac:picMk id="3" creationId="{216B0E2D-338C-4DFE-B2A3-C11CC9F199B5}"/>
+          </ac:picMkLst>
+        </pc:picChg>
+        <pc:picChg chg="add mod modCrop">
+          <ac:chgData name="Desautels Israel Study Trip" userId="b164cf87-9e27-483d-96be-d558d6a89ad0" providerId="ADAL" clId="{CBC2BE33-CB9D-4F41-A069-55FBA2E3D275}" dt="2020-11-02T05:54:35.384" v="250" actId="1037"/>
+          <ac:picMkLst>
+            <pc:docMk/>
+            <pc:sldMk cId="1151188242" sldId="259"/>
+            <ac:picMk id="5" creationId="{645B28F2-C8E4-4E5E-93A9-EFB13DBCADF3}"/>
+          </ac:picMkLst>
+        </pc:picChg>
+      </pc:sldChg>
+    </pc:docChg>
+  </pc:docChgLst>
+</pc:chgInfo>
 </file>
 
 <file path=ppt/slideLayouts/slideLayout1.xml><?xml version="1.0" encoding="utf-8"?>
@@ -241,7 +426,7 @@
           <a:p>
             <a:fld id="{94C77411-B723-4FFA-B575-15E27B9FE784}" type="datetimeFigureOut">
               <a:rPr lang="en-US" smtClean="0"/>
-              <a:t>10/6/2020</a:t>
+              <a:t>11/2/2020</a:t>
             </a:fld>
             <a:endParaRPr lang="en-US"/>
           </a:p>
@@ -411,7 +596,7 @@
           <a:p>
             <a:fld id="{94C77411-B723-4FFA-B575-15E27B9FE784}" type="datetimeFigureOut">
               <a:rPr lang="en-US" smtClean="0"/>
-              <a:t>10/6/2020</a:t>
+              <a:t>11/2/2020</a:t>
             </a:fld>
             <a:endParaRPr lang="en-US"/>
           </a:p>
@@ -591,7 +776,7 @@
           <a:p>
             <a:fld id="{94C77411-B723-4FFA-B575-15E27B9FE784}" type="datetimeFigureOut">
               <a:rPr lang="en-US" smtClean="0"/>
-              <a:t>10/6/2020</a:t>
+              <a:t>11/2/2020</a:t>
             </a:fld>
             <a:endParaRPr lang="en-US"/>
           </a:p>
@@ -761,7 +946,7 @@
           <a:p>
             <a:fld id="{94C77411-B723-4FFA-B575-15E27B9FE784}" type="datetimeFigureOut">
               <a:rPr lang="en-US" smtClean="0"/>
-              <a:t>10/6/2020</a:t>
+              <a:t>11/2/2020</a:t>
             </a:fld>
             <a:endParaRPr lang="en-US"/>
           </a:p>
@@ -1005,7 +1190,7 @@
           <a:p>
             <a:fld id="{94C77411-B723-4FFA-B575-15E27B9FE784}" type="datetimeFigureOut">
               <a:rPr lang="en-US" smtClean="0"/>
-              <a:t>10/6/2020</a:t>
+              <a:t>11/2/2020</a:t>
             </a:fld>
             <a:endParaRPr lang="en-US"/>
           </a:p>
@@ -1237,7 +1422,7 @@
           <a:p>
             <a:fld id="{94C77411-B723-4FFA-B575-15E27B9FE784}" type="datetimeFigureOut">
               <a:rPr lang="en-US" smtClean="0"/>
-              <a:t>10/6/2020</a:t>
+              <a:t>11/2/2020</a:t>
             </a:fld>
             <a:endParaRPr lang="en-US"/>
           </a:p>
@@ -1604,7 +1789,7 @@
           <a:p>
             <a:fld id="{94C77411-B723-4FFA-B575-15E27B9FE784}" type="datetimeFigureOut">
               <a:rPr lang="en-US" smtClean="0"/>
-              <a:t>10/6/2020</a:t>
+              <a:t>11/2/2020</a:t>
             </a:fld>
             <a:endParaRPr lang="en-US"/>
           </a:p>
@@ -1722,7 +1907,7 @@
           <a:p>
             <a:fld id="{94C77411-B723-4FFA-B575-15E27B9FE784}" type="datetimeFigureOut">
               <a:rPr lang="en-US" smtClean="0"/>
-              <a:t>10/6/2020</a:t>
+              <a:t>11/2/2020</a:t>
             </a:fld>
             <a:endParaRPr lang="en-US"/>
           </a:p>
@@ -1817,7 +2002,7 @@
           <a:p>
             <a:fld id="{94C77411-B723-4FFA-B575-15E27B9FE784}" type="datetimeFigureOut">
               <a:rPr lang="en-US" smtClean="0"/>
-              <a:t>10/6/2020</a:t>
+              <a:t>11/2/2020</a:t>
             </a:fld>
             <a:endParaRPr lang="en-US"/>
           </a:p>
@@ -2094,7 +2279,7 @@
           <a:p>
             <a:fld id="{94C77411-B723-4FFA-B575-15E27B9FE784}" type="datetimeFigureOut">
               <a:rPr lang="en-US" smtClean="0"/>
-              <a:t>10/6/2020</a:t>
+              <a:t>11/2/2020</a:t>
             </a:fld>
             <a:endParaRPr lang="en-US"/>
           </a:p>
@@ -2351,7 +2536,7 @@
           <a:p>
             <a:fld id="{94C77411-B723-4FFA-B575-15E27B9FE784}" type="datetimeFigureOut">
               <a:rPr lang="en-US" smtClean="0"/>
-              <a:t>10/6/2020</a:t>
+              <a:t>11/2/2020</a:t>
             </a:fld>
             <a:endParaRPr lang="en-US"/>
           </a:p>
@@ -2564,7 +2749,7 @@
           <a:p>
             <a:fld id="{94C77411-B723-4FFA-B575-15E27B9FE784}" type="datetimeFigureOut">
               <a:rPr lang="en-US" smtClean="0"/>
-              <a:t>10/6/2020</a:t>
+              <a:t>11/2/2020</a:t>
             </a:fld>
             <a:endParaRPr lang="en-US"/>
           </a:p>
@@ -4378,12 +4563,94 @@
           </a:p>
         </p:txBody>
       </p:sp>
+      <p:sp>
+        <p:nvSpPr>
+          <p:cNvPr id="52" name="TextBox 51">
+            <a:extLst>
+              <a:ext uri="{FF2B5EF4-FFF2-40B4-BE49-F238E27FC236}">
+                <a16:creationId xmlns:a16="http://schemas.microsoft.com/office/drawing/2014/main" id="{BB553178-3D24-4B0E-A44A-E48747E9370E}"/>
+              </a:ext>
+            </a:extLst>
+          </p:cNvPr>
+          <p:cNvSpPr txBox="1"/>
+          <p:nvPr/>
+        </p:nvSpPr>
+        <p:spPr>
+          <a:xfrm>
+            <a:off x="3348585" y="5783923"/>
+            <a:ext cx="2508444" cy="276999"/>
+          </a:xfrm>
+          <a:prstGeom prst="rect">
+            <a:avLst/>
+          </a:prstGeom>
+          <a:solidFill>
+            <a:schemeClr val="bg1"/>
+          </a:solidFill>
+        </p:spPr>
+        <p:txBody>
+          <a:bodyPr wrap="none" rtlCol="0">
+            <a:spAutoFit/>
+          </a:bodyPr>
+          <a:lstStyle/>
+          <a:p>
+            <a:r>
+              <a:rPr lang="en-US" sz="1200" i="1" dirty="0"/>
+              <a:t>g</a:t>
+            </a:r>
+            <a:r>
+              <a:rPr lang="en-US" sz="1200" dirty="0"/>
+              <a:t>: gender differences in reapplication</a:t>
+            </a:r>
+          </a:p>
+        </p:txBody>
+      </p:sp>
+      <p:sp>
+        <p:nvSpPr>
+          <p:cNvPr id="53" name="TextBox 52">
+            <a:extLst>
+              <a:ext uri="{FF2B5EF4-FFF2-40B4-BE49-F238E27FC236}">
+                <a16:creationId xmlns:a16="http://schemas.microsoft.com/office/drawing/2014/main" id="{3BE7DB67-6AA7-4999-B8CF-23AA688BB0FD}"/>
+              </a:ext>
+            </a:extLst>
+          </p:cNvPr>
+          <p:cNvSpPr txBox="1"/>
+          <p:nvPr/>
+        </p:nvSpPr>
+        <p:spPr>
+          <a:xfrm>
+            <a:off x="846685" y="2525915"/>
+            <a:ext cx="369332" cy="1903983"/>
+          </a:xfrm>
+          <a:prstGeom prst="rect">
+            <a:avLst/>
+          </a:prstGeom>
+          <a:solidFill>
+            <a:schemeClr val="bg1"/>
+          </a:solidFill>
+        </p:spPr>
+        <p:txBody>
+          <a:bodyPr vert="vert270" wrap="none" rtlCol="0">
+            <a:spAutoFit/>
+          </a:bodyPr>
+          <a:lstStyle/>
+          <a:p>
+            <a:r>
+              <a:rPr lang="en-US" sz="1200" i="1" dirty="0"/>
+              <a:t>b</a:t>
+            </a:r>
+            <a:r>
+              <a:rPr lang="en-US" sz="1200" dirty="0"/>
+              <a:t>: baseline reapplication rate</a:t>
+            </a:r>
+          </a:p>
+        </p:txBody>
+      </p:sp>
       <p:pic>
         <p:nvPicPr>
-          <p:cNvPr id="55" name="Picture 54" descr="A picture containing chart&#10;&#10;Description automatically generated">
+          <p:cNvPr id="3" name="Picture 2" descr="Chart, radar chart, sunburst chart&#10;&#10;Description automatically generated">
             <a:extLst>
               <a:ext uri="{FF2B5EF4-FFF2-40B4-BE49-F238E27FC236}">
-                <a16:creationId xmlns:a16="http://schemas.microsoft.com/office/drawing/2014/main" id="{6CA0B692-E00A-4D4C-A789-3D8A3B7C4B64}"/>
+                <a16:creationId xmlns:a16="http://schemas.microsoft.com/office/drawing/2014/main" id="{ED1D9CD6-78FE-4AA5-99CA-9ED10487F6A5}"/>
               </a:ext>
             </a:extLst>
           </p:cNvPr>
@@ -4400,101 +4667,19 @@
               </a:ext>
             </a:extLst>
           </a:blip>
-          <a:srcRect l="1561" t="2991" r="741" b="2805"/>
+          <a:srcRect l="4442" t="4338" r="1155" b="5070"/>
           <a:stretch/>
         </p:blipFill>
         <p:spPr>
           <a:xfrm>
-            <a:off x="1216017" y="1690689"/>
-            <a:ext cx="6677795" cy="3872717"/>
+            <a:off x="1216013" y="1535055"/>
+            <a:ext cx="6923752" cy="4271300"/>
           </a:xfrm>
           <a:prstGeom prst="rect">
             <a:avLst/>
           </a:prstGeom>
         </p:spPr>
       </p:pic>
-      <p:sp>
-        <p:nvSpPr>
-          <p:cNvPr id="52" name="TextBox 51">
-            <a:extLst>
-              <a:ext uri="{FF2B5EF4-FFF2-40B4-BE49-F238E27FC236}">
-                <a16:creationId xmlns:a16="http://schemas.microsoft.com/office/drawing/2014/main" id="{BB553178-3D24-4B0E-A44A-E48747E9370E}"/>
-              </a:ext>
-            </a:extLst>
-          </p:cNvPr>
-          <p:cNvSpPr txBox="1"/>
-          <p:nvPr/>
-        </p:nvSpPr>
-        <p:spPr>
-          <a:xfrm>
-            <a:off x="3348585" y="5634569"/>
-            <a:ext cx="2508444" cy="276999"/>
-          </a:xfrm>
-          <a:prstGeom prst="rect">
-            <a:avLst/>
-          </a:prstGeom>
-          <a:solidFill>
-            <a:schemeClr val="bg1"/>
-          </a:solidFill>
-        </p:spPr>
-        <p:txBody>
-          <a:bodyPr wrap="none" rtlCol="0">
-            <a:spAutoFit/>
-          </a:bodyPr>
-          <a:lstStyle/>
-          <a:p>
-            <a:r>
-              <a:rPr lang="en-US" sz="1200" i="1" dirty="0"/>
-              <a:t>g</a:t>
-            </a:r>
-            <a:r>
-              <a:rPr lang="en-US" sz="1200" dirty="0"/>
-              <a:t>: gender differences in reapplication</a:t>
-            </a:r>
-          </a:p>
-        </p:txBody>
-      </p:sp>
-      <p:sp>
-        <p:nvSpPr>
-          <p:cNvPr id="53" name="TextBox 52">
-            <a:extLst>
-              <a:ext uri="{FF2B5EF4-FFF2-40B4-BE49-F238E27FC236}">
-                <a16:creationId xmlns:a16="http://schemas.microsoft.com/office/drawing/2014/main" id="{3BE7DB67-6AA7-4999-B8CF-23AA688BB0FD}"/>
-              </a:ext>
-            </a:extLst>
-          </p:cNvPr>
-          <p:cNvSpPr txBox="1"/>
-          <p:nvPr/>
-        </p:nvSpPr>
-        <p:spPr>
-          <a:xfrm>
-            <a:off x="846685" y="2525915"/>
-            <a:ext cx="369332" cy="1903983"/>
-          </a:xfrm>
-          <a:prstGeom prst="rect">
-            <a:avLst/>
-          </a:prstGeom>
-          <a:solidFill>
-            <a:schemeClr val="bg1"/>
-          </a:solidFill>
-        </p:spPr>
-        <p:txBody>
-          <a:bodyPr vert="vert270" wrap="none" rtlCol="0">
-            <a:spAutoFit/>
-          </a:bodyPr>
-          <a:lstStyle/>
-          <a:p>
-            <a:r>
-              <a:rPr lang="en-US" sz="1200" i="1" dirty="0"/>
-              <a:t>b</a:t>
-            </a:r>
-            <a:r>
-              <a:rPr lang="en-US" sz="1200" dirty="0"/>
-              <a:t>: baseline reapplication rate</a:t>
-            </a:r>
-          </a:p>
-        </p:txBody>
-      </p:sp>
     </p:spTree>
     <p:extLst>
       <p:ext uri="{BB962C8B-B14F-4D97-AF65-F5344CB8AC3E}">
@@ -4559,42 +4744,6 @@
           </a:p>
         </p:txBody>
       </p:sp>
-      <p:pic>
-        <p:nvPicPr>
-          <p:cNvPr id="3" name="Picture 2" descr="A picture containing calendar&#10;&#10;Description automatically generated">
-            <a:extLst>
-              <a:ext uri="{FF2B5EF4-FFF2-40B4-BE49-F238E27FC236}">
-                <a16:creationId xmlns:a16="http://schemas.microsoft.com/office/drawing/2014/main" id="{216B0E2D-338C-4DFE-B2A3-C11CC9F199B5}"/>
-              </a:ext>
-            </a:extLst>
-          </p:cNvPr>
-          <p:cNvPicPr>
-            <a:picLocks noChangeAspect="1"/>
-          </p:cNvPicPr>
-          <p:nvPr/>
-        </p:nvPicPr>
-        <p:blipFill>
-          <a:blip r:embed="rId2">
-            <a:extLst>
-              <a:ext uri="{28A0092B-C50C-407E-A947-70E740481C1C}">
-                <a14:useLocalDpi xmlns:a14="http://schemas.microsoft.com/office/drawing/2010/main" val="0"/>
-              </a:ext>
-            </a:extLst>
-          </a:blip>
-          <a:stretch>
-            <a:fillRect/>
-          </a:stretch>
-        </p:blipFill>
-        <p:spPr>
-          <a:xfrm>
-            <a:off x="1238250" y="1517612"/>
-            <a:ext cx="6667500" cy="4286250"/>
-          </a:xfrm>
-          <a:prstGeom prst="rect">
-            <a:avLst/>
-          </a:prstGeom>
-        </p:spPr>
-      </p:pic>
       <p:grpSp>
         <p:nvGrpSpPr>
           <p:cNvPr id="10" name="Group 9">
@@ -4609,7 +4758,7 @@
         </p:nvGrpSpPr>
         <p:grpSpPr>
           <a:xfrm>
-            <a:off x="1790700" y="5699839"/>
+            <a:off x="1565232" y="5699839"/>
             <a:ext cx="1028701" cy="461665"/>
             <a:chOff x="1824566" y="6032498"/>
             <a:chExt cx="1028701" cy="461665"/>
@@ -4716,7 +4865,7 @@
         </p:nvGrpSpPr>
         <p:grpSpPr>
           <a:xfrm>
-            <a:off x="3098800" y="5699838"/>
+            <a:off x="2998592" y="5699838"/>
             <a:ext cx="1028701" cy="461665"/>
             <a:chOff x="1824566" y="6032498"/>
             <a:chExt cx="1028701" cy="461665"/>
@@ -4823,7 +4972,7 @@
         </p:nvGrpSpPr>
         <p:grpSpPr>
           <a:xfrm>
-            <a:off x="4326467" y="5699838"/>
+            <a:off x="4073482" y="4883559"/>
             <a:ext cx="1028701" cy="461665"/>
             <a:chOff x="1824566" y="6032498"/>
             <a:chExt cx="1028701" cy="461665"/>
@@ -4930,7 +5079,7 @@
         </p:nvGrpSpPr>
         <p:grpSpPr>
           <a:xfrm>
-            <a:off x="5507567" y="5699838"/>
+            <a:off x="5783941" y="5699838"/>
             <a:ext cx="1028701" cy="461665"/>
             <a:chOff x="1824566" y="6032498"/>
             <a:chExt cx="1028701" cy="461665"/>
@@ -5037,7 +5186,7 @@
         </p:nvGrpSpPr>
         <p:grpSpPr>
           <a:xfrm>
-            <a:off x="6739467" y="5699837"/>
+            <a:off x="7222520" y="5699837"/>
             <a:ext cx="1028701" cy="461665"/>
             <a:chOff x="1824566" y="6032498"/>
             <a:chExt cx="1028701" cy="461665"/>
@@ -5144,7 +5293,7 @@
         </p:nvGrpSpPr>
         <p:grpSpPr>
           <a:xfrm>
-            <a:off x="1033224" y="4008967"/>
+            <a:off x="807756" y="4071597"/>
             <a:ext cx="553998" cy="585093"/>
             <a:chOff x="1879602" y="5615517"/>
             <a:chExt cx="553998" cy="1028700"/>
@@ -5254,7 +5403,7 @@
         </p:nvGrpSpPr>
         <p:grpSpPr>
           <a:xfrm>
-            <a:off x="1033224" y="4746571"/>
+            <a:off x="807756" y="4896883"/>
             <a:ext cx="553998" cy="651176"/>
             <a:chOff x="1879602" y="5615517"/>
             <a:chExt cx="553998" cy="1028700"/>
@@ -5364,7 +5513,7 @@
         </p:nvGrpSpPr>
         <p:grpSpPr>
           <a:xfrm>
-            <a:off x="1033224" y="3271362"/>
+            <a:off x="807756" y="3271362"/>
             <a:ext cx="553998" cy="585093"/>
             <a:chOff x="1879602" y="5615517"/>
             <a:chExt cx="553998" cy="1028700"/>
@@ -5474,7 +5623,7 @@
         </p:nvGrpSpPr>
         <p:grpSpPr>
           <a:xfrm>
-            <a:off x="1033224" y="2572699"/>
+            <a:off x="807756" y="2485017"/>
             <a:ext cx="553998" cy="585093"/>
             <a:chOff x="1879602" y="5615517"/>
             <a:chExt cx="553998" cy="1028700"/>
@@ -5584,10 +5733,10 @@
         </p:nvGrpSpPr>
         <p:grpSpPr>
           <a:xfrm>
-            <a:off x="1033224" y="1818882"/>
-            <a:ext cx="553998" cy="585093"/>
-            <a:chOff x="1879602" y="5615517"/>
-            <a:chExt cx="553998" cy="1028700"/>
+            <a:off x="807756" y="1674833"/>
+            <a:ext cx="553998" cy="585113"/>
+            <a:chOff x="1879602" y="5615487"/>
+            <a:chExt cx="553998" cy="1028730"/>
           </a:xfrm>
         </p:grpSpPr>
         <p:cxnSp>
@@ -5645,8 +5794,8 @@
           </p:nvSpPr>
           <p:spPr>
             <a:xfrm>
-              <a:off x="1879602" y="5615517"/>
-              <a:ext cx="553998" cy="1028698"/>
+              <a:off x="1879602" y="5615487"/>
+              <a:ext cx="553998" cy="1028693"/>
             </a:xfrm>
             <a:prstGeom prst="rect">
               <a:avLst/>
@@ -5675,6 +5824,148 @@
               <a:r>
                 <a:rPr lang="en-US" sz="1200" i="1" dirty="0"/>
                 <a:t>b</a:t>
+              </a:r>
+            </a:p>
+          </p:txBody>
+        </p:sp>
+      </p:grpSp>
+      <p:pic>
+        <p:nvPicPr>
+          <p:cNvPr id="5" name="Picture 4" descr="A picture containing orange&#10;&#10;Description automatically generated">
+            <a:extLst>
+              <a:ext uri="{FF2B5EF4-FFF2-40B4-BE49-F238E27FC236}">
+                <a16:creationId xmlns:a16="http://schemas.microsoft.com/office/drawing/2014/main" id="{645B28F2-C8E4-4E5E-93A9-EFB13DBCADF3}"/>
+              </a:ext>
+            </a:extLst>
+          </p:cNvPr>
+          <p:cNvPicPr>
+            <a:picLocks noChangeAspect="1"/>
+          </p:cNvPicPr>
+          <p:nvPr/>
+        </p:nvPicPr>
+        <p:blipFill rotWithShape="1">
+          <a:blip r:embed="rId2">
+            <a:extLst>
+              <a:ext uri="{28A0092B-C50C-407E-A947-70E740481C1C}">
+                <a14:useLocalDpi xmlns:a14="http://schemas.microsoft.com/office/drawing/2010/main" val="0"/>
+              </a:ext>
+            </a:extLst>
+          </a:blip>
+          <a:srcRect l="2123" t="2292" b="2080"/>
+          <a:stretch/>
+        </p:blipFill>
+        <p:spPr>
+          <a:xfrm>
+            <a:off x="1341690" y="1566154"/>
+            <a:ext cx="7008310" cy="4120442"/>
+          </a:xfrm>
+          <a:prstGeom prst="rect">
+            <a:avLst/>
+          </a:prstGeom>
+        </p:spPr>
+      </p:pic>
+      <p:grpSp>
+        <p:nvGrpSpPr>
+          <p:cNvPr id="50" name="Group 49">
+            <a:extLst>
+              <a:ext uri="{FF2B5EF4-FFF2-40B4-BE49-F238E27FC236}">
+                <a16:creationId xmlns:a16="http://schemas.microsoft.com/office/drawing/2014/main" id="{1009C8FE-6B48-4BE9-984A-4AF6BBBF44BD}"/>
+              </a:ext>
+            </a:extLst>
+          </p:cNvPr>
+          <p:cNvGrpSpPr/>
+          <p:nvPr/>
+        </p:nvGrpSpPr>
+        <p:grpSpPr>
+          <a:xfrm>
+            <a:off x="4403592" y="5698872"/>
+            <a:ext cx="1028701" cy="461665"/>
+            <a:chOff x="1824566" y="6032498"/>
+            <a:chExt cx="1028701" cy="461665"/>
+          </a:xfrm>
+        </p:grpSpPr>
+        <p:cxnSp>
+          <p:nvCxnSpPr>
+            <p:cNvPr id="51" name="Straight Arrow Connector 50">
+              <a:extLst>
+                <a:ext uri="{FF2B5EF4-FFF2-40B4-BE49-F238E27FC236}">
+                  <a16:creationId xmlns:a16="http://schemas.microsoft.com/office/drawing/2014/main" id="{672F3D2A-ED39-40D2-B9BB-83DAB6E03D80}"/>
+                </a:ext>
+              </a:extLst>
+            </p:cNvPr>
+            <p:cNvCxnSpPr/>
+            <p:nvPr/>
+          </p:nvCxnSpPr>
+          <p:spPr>
+            <a:xfrm>
+              <a:off x="1824567" y="6129867"/>
+              <a:ext cx="1028700" cy="0"/>
+            </a:xfrm>
+            <a:prstGeom prst="straightConnector1">
+              <a:avLst/>
+            </a:prstGeom>
+            <a:ln>
+              <a:tailEnd type="triangle"/>
+            </a:ln>
+          </p:spPr>
+          <p:style>
+            <a:lnRef idx="1">
+              <a:schemeClr val="accent1"/>
+            </a:lnRef>
+            <a:fillRef idx="0">
+              <a:schemeClr val="accent1"/>
+            </a:fillRef>
+            <a:effectRef idx="0">
+              <a:schemeClr val="accent1"/>
+            </a:effectRef>
+            <a:fontRef idx="minor">
+              <a:schemeClr val="tx1"/>
+            </a:fontRef>
+          </p:style>
+        </p:cxnSp>
+        <p:sp>
+          <p:nvSpPr>
+            <p:cNvPr id="52" name="TextBox 51">
+              <a:extLst>
+                <a:ext uri="{FF2B5EF4-FFF2-40B4-BE49-F238E27FC236}">
+                  <a16:creationId xmlns:a16="http://schemas.microsoft.com/office/drawing/2014/main" id="{DA048C9A-6420-46A7-A11D-63136774BEF3}"/>
+                </a:ext>
+              </a:extLst>
+            </p:cNvPr>
+            <p:cNvSpPr txBox="1"/>
+            <p:nvPr/>
+          </p:nvSpPr>
+          <p:spPr>
+            <a:xfrm>
+              <a:off x="1824566" y="6032498"/>
+              <a:ext cx="1024468" cy="461665"/>
+            </a:xfrm>
+            <a:prstGeom prst="rect">
+              <a:avLst/>
+            </a:prstGeom>
+            <a:noFill/>
+          </p:spPr>
+          <p:txBody>
+            <a:bodyPr wrap="square" rtlCol="0">
+              <a:spAutoFit/>
+            </a:bodyPr>
+            <a:lstStyle/>
+            <a:p>
+              <a:pPr algn="ctr"/>
+              <a:r>
+                <a:rPr lang="en-US" sz="1200" i="1" dirty="0"/>
+                <a:t>g</a:t>
+              </a:r>
+            </a:p>
+            <a:p>
+              <a:pPr algn="ctr"/>
+              <a:r>
+                <a:rPr lang="en-US" sz="1200" i="1" dirty="0"/>
+                <a:t>p</a:t>
+              </a:r>
+              <a:r>
+                <a:rPr lang="en-US" sz="1200" dirty="0"/>
+                <a:t>=0.30</a:t>
               </a:r>
             </a:p>
           </p:txBody>
@@ -5955,6 +6246,21 @@
 </file>
 
 <file path=customXml/item1.xml><?xml version="1.0" encoding="utf-8"?>
+<p:properties xmlns:p="http://schemas.microsoft.com/office/2006/metadata/properties" xmlns:xsi="http://www.w3.org/2001/XMLSchema-instance" xmlns:pc="http://schemas.microsoft.com/office/infopath/2007/PartnerControls">
+  <documentManagement/>
+</p:properties>
+</file>
+
+<file path=customXml/item2.xml><?xml version="1.0" encoding="utf-8"?>
+<?mso-contentType ?>
+<FormTemplates xmlns="http://schemas.microsoft.com/sharepoint/v3/contenttype/forms">
+  <Display>DocumentLibraryForm</Display>
+  <Edit>DocumentLibraryForm</Edit>
+  <New>DocumentLibraryForm</New>
+</FormTemplates>
+</file>
+
+<file path=customXml/item3.xml><?xml version="1.0" encoding="utf-8"?>
 <ct:contentTypeSchema xmlns:ct="http://schemas.microsoft.com/office/2006/metadata/contentType" xmlns:ma="http://schemas.microsoft.com/office/2006/metadata/properties/metaAttributes" ct:_="" ma:_="" ma:contentTypeName="Document" ma:contentTypeID="0x010100A0C705D902B8F64CAAF02653EF81F96A" ma:contentTypeVersion="15" ma:contentTypeDescription="Create a new document." ma:contentTypeScope="" ma:versionID="e85ae2bf280e7931939e5edb77f424fe">
   <xsd:schema xmlns:xsd="http://www.w3.org/2001/XMLSchema" xmlns:xs="http://www.w3.org/2001/XMLSchema" xmlns:p="http://schemas.microsoft.com/office/2006/metadata/properties" xmlns:ns3="50d52fa3-2d4f-4d98-80c2-cb68fcf96e06" xmlns:ns4="c8386d2e-91e1-414a-9b55-bdf3a933a2ad" targetNamespace="http://schemas.microsoft.com/office/2006/metadata/properties" ma:root="true" ma:fieldsID="593bc4ba48c9a954e89662f0bb31e6b7" ns3:_="" ns4:_="">
     <xsd:import namespace="50d52fa3-2d4f-4d98-80c2-cb68fcf96e06"/>
@@ -6191,22 +6497,24 @@
 </ct:contentTypeSchema>
 </file>
 
-<file path=customXml/item2.xml><?xml version="1.0" encoding="utf-8"?>
-<?mso-contentType ?>
-<FormTemplates xmlns="http://schemas.microsoft.com/sharepoint/v3/contenttype/forms">
-  <Display>DocumentLibraryForm</Display>
-  <Edit>DocumentLibraryForm</Edit>
-  <New>DocumentLibraryForm</New>
-</FormTemplates>
+<file path=customXml/itemProps1.xml><?xml version="1.0" encoding="utf-8"?>
+<ds:datastoreItem xmlns:ds="http://schemas.openxmlformats.org/officeDocument/2006/customXml" ds:itemID="{C12DE22F-D1CC-4F65-BDA8-91C99FBD566D}">
+  <ds:schemaRefs>
+    <ds:schemaRef ds:uri="http://schemas.microsoft.com/office/2006/metadata/properties"/>
+    <ds:schemaRef ds:uri="http://schemas.microsoft.com/office/infopath/2007/PartnerControls"/>
+  </ds:schemaRefs>
+</ds:datastoreItem>
 </file>
 
-<file path=customXml/item3.xml><?xml version="1.0" encoding="utf-8"?>
-<p:properties xmlns:p="http://schemas.microsoft.com/office/2006/metadata/properties" xmlns:xsi="http://www.w3.org/2001/XMLSchema-instance" xmlns:pc="http://schemas.microsoft.com/office/infopath/2007/PartnerControls">
-  <documentManagement/>
-</p:properties>
+<file path=customXml/itemProps2.xml><?xml version="1.0" encoding="utf-8"?>
+<ds:datastoreItem xmlns:ds="http://schemas.openxmlformats.org/officeDocument/2006/customXml" ds:itemID="{4176F748-4E36-4C88-9EC3-2C6019768886}">
+  <ds:schemaRefs>
+    <ds:schemaRef ds:uri="http://schemas.microsoft.com/sharepoint/v3/contenttype/forms"/>
+  </ds:schemaRefs>
+</ds:datastoreItem>
 </file>
 
-<file path=customXml/itemProps1.xml><?xml version="1.0" encoding="utf-8"?>
+<file path=customXml/itemProps3.xml><?xml version="1.0" encoding="utf-8"?>
 <ds:datastoreItem xmlns:ds="http://schemas.openxmlformats.org/officeDocument/2006/customXml" ds:itemID="{8486E7BC-F911-4829-9AD9-F7F985B1A628}">
   <ds:schemaRefs>
     <ds:schemaRef ds:uri="http://schemas.microsoft.com/office/2006/metadata/contentType"/>
@@ -6223,21 +6531,4 @@
     <ds:schemaRef ds:uri="http://schemas.microsoft.com/internal/obd"/>
   </ds:schemaRefs>
 </ds:datastoreItem>
-</file>
-
-<file path=customXml/itemProps2.xml><?xml version="1.0" encoding="utf-8"?>
-<ds:datastoreItem xmlns:ds="http://schemas.openxmlformats.org/officeDocument/2006/customXml" ds:itemID="{4176F748-4E36-4C88-9EC3-2C6019768886}">
-  <ds:schemaRefs>
-    <ds:schemaRef ds:uri="http://schemas.microsoft.com/sharepoint/v3/contenttype/forms"/>
-  </ds:schemaRefs>
-</ds:datastoreItem>
-</file>
-
-<file path=customXml/itemProps3.xml><?xml version="1.0" encoding="utf-8"?>
-<ds:datastoreItem xmlns:ds="http://schemas.openxmlformats.org/officeDocument/2006/customXml" ds:itemID="{C12DE22F-D1CC-4F65-BDA8-91C99FBD566D}">
-  <ds:schemaRefs>
-    <ds:schemaRef ds:uri="http://schemas.microsoft.com/office/2006/metadata/properties"/>
-    <ds:schemaRef ds:uri="http://schemas.microsoft.com/office/infopath/2007/PartnerControls"/>
-  </ds:schemaRefs>
-</ds:datastoreItem>
 </file>
</xml_diff>

<commit_message>
update paper tables and figure files
</commit_message>
<xml_diff>
--- a/ParamSpaceFigures.pptx
+++ b/ParamSpaceFigures.pptx
@@ -9,6 +9,10 @@
     <p:sldId id="258" r:id="rId6"/>
     <p:sldId id="257" r:id="rId7"/>
     <p:sldId id="259" r:id="rId8"/>
+    <p:sldId id="260" r:id="rId9"/>
+    <p:sldId id="261" r:id="rId10"/>
+    <p:sldId id="262" r:id="rId11"/>
+    <p:sldId id="263" r:id="rId12"/>
   </p:sldIdLst>
   <p:sldSz cx="9144000" cy="6858000" type="letter"/>
   <p:notesSz cx="6858000" cy="9144000"/>
@@ -118,7 +122,7 @@
 <file path=ppt/revisionInfo.xml><?xml version="1.0" encoding="utf-8"?>
 <p1510:revInfo xmlns:a="http://schemas.openxmlformats.org/drawingml/2006/main" xmlns:r="http://schemas.openxmlformats.org/officeDocument/2006/relationships" xmlns:p1510="http://schemas.microsoft.com/office/powerpoint/2015/10/main">
   <p1510:revLst>
-    <p1510:client id="{CBC2BE33-CB9D-4F41-A069-55FBA2E3D275}" v="3" dt="2020-11-02T05:55:32.716"/>
+    <p1510:client id="{CBC2BE33-CB9D-4F41-A069-55FBA2E3D275}" v="12" dt="2020-12-27T20:51:07.949"/>
   </p1510:revLst>
 </p1510:revInfo>
 </file>
@@ -292,6 +296,319 @@
       </pc:sldChg>
     </pc:docChg>
   </pc:docChgLst>
+  <pc:docChgLst>
+    <pc:chgData name="Israelstudytrip" userId="b164cf87-9e27-483d-96be-d558d6a89ad0" providerId="ADAL" clId="{CBC2BE33-CB9D-4F41-A069-55FBA2E3D275}"/>
+    <pc:docChg chg="undo custSel addSld modSld">
+      <pc:chgData name="Israelstudytrip" userId="b164cf87-9e27-483d-96be-d558d6a89ad0" providerId="ADAL" clId="{CBC2BE33-CB9D-4F41-A069-55FBA2E3D275}" dt="2020-12-27T20:54:58.076" v="667" actId="20577"/>
+      <pc:docMkLst>
+        <pc:docMk/>
+      </pc:docMkLst>
+      <pc:sldChg chg="addSp delSp modSp">
+        <pc:chgData name="Israelstudytrip" userId="b164cf87-9e27-483d-96be-d558d6a89ad0" providerId="ADAL" clId="{CBC2BE33-CB9D-4F41-A069-55FBA2E3D275}" dt="2020-12-27T20:47:43.039" v="442" actId="732"/>
+        <pc:sldMkLst>
+          <pc:docMk/>
+          <pc:sldMk cId="329367528" sldId="256"/>
+        </pc:sldMkLst>
+        <pc:spChg chg="mod">
+          <ac:chgData name="Israelstudytrip" userId="b164cf87-9e27-483d-96be-d558d6a89ad0" providerId="ADAL" clId="{CBC2BE33-CB9D-4F41-A069-55FBA2E3D275}" dt="2020-12-23T07:06:59.461" v="46" actId="114"/>
+          <ac:spMkLst>
+            <pc:docMk/>
+            <pc:sldMk cId="329367528" sldId="256"/>
+            <ac:spMk id="4" creationId="{EBC4ABCE-05FA-4150-AE99-F6545909F115}"/>
+          </ac:spMkLst>
+        </pc:spChg>
+        <pc:spChg chg="del">
+          <ac:chgData name="Israelstudytrip" userId="b164cf87-9e27-483d-96be-d558d6a89ad0" providerId="ADAL" clId="{CBC2BE33-CB9D-4F41-A069-55FBA2E3D275}" dt="2020-12-23T07:05:42.362" v="5" actId="478"/>
+          <ac:spMkLst>
+            <pc:docMk/>
+            <pc:sldMk cId="329367528" sldId="256"/>
+            <ac:spMk id="42" creationId="{70D8D6E1-A4EA-4EF5-A7C0-E909FAE31777}"/>
+          </ac:spMkLst>
+        </pc:spChg>
+        <pc:spChg chg="del">
+          <ac:chgData name="Israelstudytrip" userId="b164cf87-9e27-483d-96be-d558d6a89ad0" providerId="ADAL" clId="{CBC2BE33-CB9D-4F41-A069-55FBA2E3D275}" dt="2020-12-27T20:47:02.263" v="437" actId="478"/>
+          <ac:spMkLst>
+            <pc:docMk/>
+            <pc:sldMk cId="329367528" sldId="256"/>
+            <ac:spMk id="43" creationId="{AE35114C-06C6-4285-A245-C8055A9B13EF}"/>
+          </ac:spMkLst>
+        </pc:spChg>
+        <pc:picChg chg="add del mod">
+          <ac:chgData name="Israelstudytrip" userId="b164cf87-9e27-483d-96be-d558d6a89ad0" providerId="ADAL" clId="{CBC2BE33-CB9D-4F41-A069-55FBA2E3D275}" dt="2020-12-27T20:46:57.087" v="436" actId="478"/>
+          <ac:picMkLst>
+            <pc:docMk/>
+            <pc:sldMk cId="329367528" sldId="256"/>
+            <ac:picMk id="3" creationId="{F0C31A25-6010-42C4-AA48-A8008456854B}"/>
+          </ac:picMkLst>
+        </pc:picChg>
+        <pc:picChg chg="add mod modCrop">
+          <ac:chgData name="Israelstudytrip" userId="b164cf87-9e27-483d-96be-d558d6a89ad0" providerId="ADAL" clId="{CBC2BE33-CB9D-4F41-A069-55FBA2E3D275}" dt="2020-12-27T20:47:43.039" v="442" actId="732"/>
+          <ac:picMkLst>
+            <pc:docMk/>
+            <pc:sldMk cId="329367528" sldId="256"/>
+            <ac:picMk id="6" creationId="{E88B94E0-47CE-4760-9A8B-0FE2F304F62C}"/>
+          </ac:picMkLst>
+        </pc:picChg>
+        <pc:picChg chg="del">
+          <ac:chgData name="Israelstudytrip" userId="b164cf87-9e27-483d-96be-d558d6a89ad0" providerId="ADAL" clId="{CBC2BE33-CB9D-4F41-A069-55FBA2E3D275}" dt="2020-12-23T07:05:10.772" v="1" actId="478"/>
+          <ac:picMkLst>
+            <pc:docMk/>
+            <pc:sldMk cId="329367528" sldId="256"/>
+            <ac:picMk id="41" creationId="{D541C5F7-FDA3-41BC-A3DE-9A5CB82CB4DB}"/>
+          </ac:picMkLst>
+        </pc:picChg>
+      </pc:sldChg>
+      <pc:sldChg chg="addSp delSp modSp">
+        <pc:chgData name="Israelstudytrip" userId="b164cf87-9e27-483d-96be-d558d6a89ad0" providerId="ADAL" clId="{CBC2BE33-CB9D-4F41-A069-55FBA2E3D275}" dt="2020-12-27T20:54:47.900" v="665" actId="20577"/>
+        <pc:sldMkLst>
+          <pc:docMk/>
+          <pc:sldMk cId="2110773135" sldId="257"/>
+        </pc:sldMkLst>
+        <pc:spChg chg="mod">
+          <ac:chgData name="Israelstudytrip" userId="b164cf87-9e27-483d-96be-d558d6a89ad0" providerId="ADAL" clId="{CBC2BE33-CB9D-4F41-A069-55FBA2E3D275}" dt="2020-12-27T20:54:47.900" v="665" actId="20577"/>
+          <ac:spMkLst>
+            <pc:docMk/>
+            <pc:sldMk cId="2110773135" sldId="257"/>
+            <ac:spMk id="4" creationId="{EBC4ABCE-05FA-4150-AE99-F6545909F115}"/>
+          </ac:spMkLst>
+        </pc:spChg>
+        <pc:spChg chg="del">
+          <ac:chgData name="Israelstudytrip" userId="b164cf87-9e27-483d-96be-d558d6a89ad0" providerId="ADAL" clId="{CBC2BE33-CB9D-4F41-A069-55FBA2E3D275}" dt="2020-12-27T20:50:07.089" v="489" actId="478"/>
+          <ac:spMkLst>
+            <pc:docMk/>
+            <pc:sldMk cId="2110773135" sldId="257"/>
+            <ac:spMk id="52" creationId="{BB553178-3D24-4B0E-A44A-E48747E9370E}"/>
+          </ac:spMkLst>
+        </pc:spChg>
+        <pc:spChg chg="del">
+          <ac:chgData name="Israelstudytrip" userId="b164cf87-9e27-483d-96be-d558d6a89ad0" providerId="ADAL" clId="{CBC2BE33-CB9D-4F41-A069-55FBA2E3D275}" dt="2020-12-27T20:50:07.089" v="489" actId="478"/>
+          <ac:spMkLst>
+            <pc:docMk/>
+            <pc:sldMk cId="2110773135" sldId="257"/>
+            <ac:spMk id="53" creationId="{3BE7DB67-6AA7-4999-B8CF-23AA688BB0FD}"/>
+          </ac:spMkLst>
+        </pc:spChg>
+        <pc:picChg chg="del">
+          <ac:chgData name="Israelstudytrip" userId="b164cf87-9e27-483d-96be-d558d6a89ad0" providerId="ADAL" clId="{CBC2BE33-CB9D-4F41-A069-55FBA2E3D275}" dt="2020-12-23T07:10:20.599" v="156" actId="478"/>
+          <ac:picMkLst>
+            <pc:docMk/>
+            <pc:sldMk cId="2110773135" sldId="257"/>
+            <ac:picMk id="3" creationId="{ED1D9CD6-78FE-4AA5-99CA-9ED10487F6A5}"/>
+          </ac:picMkLst>
+        </pc:picChg>
+        <pc:picChg chg="add del mod modCrop">
+          <ac:chgData name="Israelstudytrip" userId="b164cf87-9e27-483d-96be-d558d6a89ad0" providerId="ADAL" clId="{CBC2BE33-CB9D-4F41-A069-55FBA2E3D275}" dt="2020-12-27T20:50:01.888" v="488" actId="478"/>
+          <ac:picMkLst>
+            <pc:docMk/>
+            <pc:sldMk cId="2110773135" sldId="257"/>
+            <ac:picMk id="5" creationId="{350C3715-E410-4578-943C-AB5F329B0938}"/>
+          </ac:picMkLst>
+        </pc:picChg>
+        <pc:picChg chg="add mod">
+          <ac:chgData name="Israelstudytrip" userId="b164cf87-9e27-483d-96be-d558d6a89ad0" providerId="ADAL" clId="{CBC2BE33-CB9D-4F41-A069-55FBA2E3D275}" dt="2020-12-27T20:50:43.745" v="493" actId="14100"/>
+          <ac:picMkLst>
+            <pc:docMk/>
+            <pc:sldMk cId="2110773135" sldId="257"/>
+            <ac:picMk id="7" creationId="{10BA66E4-CAB0-454C-B352-B6517C585331}"/>
+          </ac:picMkLst>
+        </pc:picChg>
+      </pc:sldChg>
+      <pc:sldChg chg="addSp delSp modSp">
+        <pc:chgData name="Israelstudytrip" userId="b164cf87-9e27-483d-96be-d558d6a89ad0" providerId="ADAL" clId="{CBC2BE33-CB9D-4F41-A069-55FBA2E3D275}" dt="2020-12-27T20:49:49.579" v="487" actId="1038"/>
+        <pc:sldMkLst>
+          <pc:docMk/>
+          <pc:sldMk cId="760396856" sldId="258"/>
+        </pc:sldMkLst>
+        <pc:spChg chg="mod">
+          <ac:chgData name="Israelstudytrip" userId="b164cf87-9e27-483d-96be-d558d6a89ad0" providerId="ADAL" clId="{CBC2BE33-CB9D-4F41-A069-55FBA2E3D275}" dt="2020-12-23T07:09:44.775" v="155" actId="114"/>
+          <ac:spMkLst>
+            <pc:docMk/>
+            <pc:sldMk cId="760396856" sldId="258"/>
+            <ac:spMk id="4" creationId="{EBC4ABCE-05FA-4150-AE99-F6545909F115}"/>
+          </ac:spMkLst>
+        </pc:spChg>
+        <pc:grpChg chg="mod">
+          <ac:chgData name="Israelstudytrip" userId="b164cf87-9e27-483d-96be-d558d6a89ad0" providerId="ADAL" clId="{CBC2BE33-CB9D-4F41-A069-55FBA2E3D275}" dt="2020-12-27T20:49:49.579" v="487" actId="1038"/>
+          <ac:grpSpMkLst>
+            <pc:docMk/>
+            <pc:sldMk cId="760396856" sldId="258"/>
+            <ac:grpSpMk id="23" creationId="{DE76CB12-BB74-4BAC-A0FC-AF8A182A4D8D}"/>
+          </ac:grpSpMkLst>
+        </pc:grpChg>
+        <pc:grpChg chg="mod">
+          <ac:chgData name="Israelstudytrip" userId="b164cf87-9e27-483d-96be-d558d6a89ad0" providerId="ADAL" clId="{CBC2BE33-CB9D-4F41-A069-55FBA2E3D275}" dt="2020-12-27T20:49:49.579" v="487" actId="1038"/>
+          <ac:grpSpMkLst>
+            <pc:docMk/>
+            <pc:sldMk cId="760396856" sldId="258"/>
+            <ac:grpSpMk id="26" creationId="{88BEC52C-3EB7-4AA0-B716-B68565DD7DE2}"/>
+          </ac:grpSpMkLst>
+        </pc:grpChg>
+        <pc:grpChg chg="mod">
+          <ac:chgData name="Israelstudytrip" userId="b164cf87-9e27-483d-96be-d558d6a89ad0" providerId="ADAL" clId="{CBC2BE33-CB9D-4F41-A069-55FBA2E3D275}" dt="2020-12-27T20:49:49.579" v="487" actId="1038"/>
+          <ac:grpSpMkLst>
+            <pc:docMk/>
+            <pc:sldMk cId="760396856" sldId="258"/>
+            <ac:grpSpMk id="29" creationId="{156D22DD-006C-4925-BB48-65D6569CCB48}"/>
+          </ac:grpSpMkLst>
+        </pc:grpChg>
+        <pc:grpChg chg="mod">
+          <ac:chgData name="Israelstudytrip" userId="b164cf87-9e27-483d-96be-d558d6a89ad0" providerId="ADAL" clId="{CBC2BE33-CB9D-4F41-A069-55FBA2E3D275}" dt="2020-12-27T20:49:49.579" v="487" actId="1038"/>
+          <ac:grpSpMkLst>
+            <pc:docMk/>
+            <pc:sldMk cId="760396856" sldId="258"/>
+            <ac:grpSpMk id="32" creationId="{99FA8751-7578-44AA-949F-19A028BFAE75}"/>
+          </ac:grpSpMkLst>
+        </pc:grpChg>
+        <pc:grpChg chg="mod">
+          <ac:chgData name="Israelstudytrip" userId="b164cf87-9e27-483d-96be-d558d6a89ad0" providerId="ADAL" clId="{CBC2BE33-CB9D-4F41-A069-55FBA2E3D275}" dt="2020-12-27T20:49:49.579" v="487" actId="1038"/>
+          <ac:grpSpMkLst>
+            <pc:docMk/>
+            <pc:sldMk cId="760396856" sldId="258"/>
+            <ac:grpSpMk id="35" creationId="{B3E2C5F7-501B-4F80-9CD1-1B6EA9F84C6D}"/>
+          </ac:grpSpMkLst>
+        </pc:grpChg>
+        <pc:picChg chg="add del mod modCrop">
+          <ac:chgData name="Israelstudytrip" userId="b164cf87-9e27-483d-96be-d558d6a89ad0" providerId="ADAL" clId="{CBC2BE33-CB9D-4F41-A069-55FBA2E3D275}" dt="2020-12-27T20:47:50.055" v="443" actId="478"/>
+          <ac:picMkLst>
+            <pc:docMk/>
+            <pc:sldMk cId="760396856" sldId="258"/>
+            <ac:picMk id="3" creationId="{B54395B0-8B2B-4B69-BFDF-C1D43DCAA4F4}"/>
+          </ac:picMkLst>
+        </pc:picChg>
+        <pc:picChg chg="add mod modCrop">
+          <ac:chgData name="Israelstudytrip" userId="b164cf87-9e27-483d-96be-d558d6a89ad0" providerId="ADAL" clId="{CBC2BE33-CB9D-4F41-A069-55FBA2E3D275}" dt="2020-12-27T20:49:31.313" v="471" actId="1037"/>
+          <ac:picMkLst>
+            <pc:docMk/>
+            <pc:sldMk cId="760396856" sldId="258"/>
+            <ac:picMk id="6" creationId="{10E33336-69B5-4A2F-B2FD-1B3B234D6197}"/>
+          </ac:picMkLst>
+        </pc:picChg>
+        <pc:picChg chg="del">
+          <ac:chgData name="Israelstudytrip" userId="b164cf87-9e27-483d-96be-d558d6a89ad0" providerId="ADAL" clId="{CBC2BE33-CB9D-4F41-A069-55FBA2E3D275}" dt="2020-12-23T07:07:09.699" v="47" actId="478"/>
+          <ac:picMkLst>
+            <pc:docMk/>
+            <pc:sldMk cId="760396856" sldId="258"/>
+            <ac:picMk id="7" creationId="{2E0C7EB1-FCBF-4B03-8155-60C7B892A305}"/>
+          </ac:picMkLst>
+        </pc:picChg>
+      </pc:sldChg>
+      <pc:sldChg chg="addSp delSp modSp">
+        <pc:chgData name="Israelstudytrip" userId="b164cf87-9e27-483d-96be-d558d6a89ad0" providerId="ADAL" clId="{CBC2BE33-CB9D-4F41-A069-55FBA2E3D275}" dt="2020-12-27T20:54:58.076" v="667" actId="20577"/>
+        <pc:sldMkLst>
+          <pc:docMk/>
+          <pc:sldMk cId="1151188242" sldId="259"/>
+        </pc:sldMkLst>
+        <pc:spChg chg="mod">
+          <ac:chgData name="Israelstudytrip" userId="b164cf87-9e27-483d-96be-d558d6a89ad0" providerId="ADAL" clId="{CBC2BE33-CB9D-4F41-A069-55FBA2E3D275}" dt="2020-12-27T20:54:58.076" v="667" actId="20577"/>
+          <ac:spMkLst>
+            <pc:docMk/>
+            <pc:sldMk cId="1151188242" sldId="259"/>
+            <ac:spMk id="4" creationId="{EBC4ABCE-05FA-4150-AE99-F6545909F115}"/>
+          </ac:spMkLst>
+        </pc:spChg>
+        <pc:grpChg chg="mod">
+          <ac:chgData name="Israelstudytrip" userId="b164cf87-9e27-483d-96be-d558d6a89ad0" providerId="ADAL" clId="{CBC2BE33-CB9D-4F41-A069-55FBA2E3D275}" dt="2020-12-27T20:53:06.150" v="597" actId="1038"/>
+          <ac:grpSpMkLst>
+            <pc:docMk/>
+            <pc:sldMk cId="1151188242" sldId="259"/>
+            <ac:grpSpMk id="10" creationId="{D8C28C92-9452-451E-8558-2920121C5855}"/>
+          </ac:grpSpMkLst>
+        </pc:grpChg>
+        <pc:grpChg chg="mod">
+          <ac:chgData name="Israelstudytrip" userId="b164cf87-9e27-483d-96be-d558d6a89ad0" providerId="ADAL" clId="{CBC2BE33-CB9D-4F41-A069-55FBA2E3D275}" dt="2020-12-27T20:53:15.379" v="613" actId="1038"/>
+          <ac:grpSpMkLst>
+            <pc:docMk/>
+            <pc:sldMk cId="1151188242" sldId="259"/>
+            <ac:grpSpMk id="23" creationId="{6AFB9536-D78B-4FBC-8ABD-F98923F0A21E}"/>
+          </ac:grpSpMkLst>
+        </pc:grpChg>
+        <pc:grpChg chg="del">
+          <ac:chgData name="Israelstudytrip" userId="b164cf87-9e27-483d-96be-d558d6a89ad0" providerId="ADAL" clId="{CBC2BE33-CB9D-4F41-A069-55FBA2E3D275}" dt="2020-12-23T07:12:14.320" v="205" actId="478"/>
+          <ac:grpSpMkLst>
+            <pc:docMk/>
+            <pc:sldMk cId="1151188242" sldId="259"/>
+            <ac:grpSpMk id="26" creationId="{8364274B-D191-4150-93D2-91EB529E7EF0}"/>
+          </ac:grpSpMkLst>
+        </pc:grpChg>
+        <pc:grpChg chg="mod">
+          <ac:chgData name="Israelstudytrip" userId="b164cf87-9e27-483d-96be-d558d6a89ad0" providerId="ADAL" clId="{CBC2BE33-CB9D-4F41-A069-55FBA2E3D275}" dt="2020-12-27T20:53:37.271" v="645" actId="1038"/>
+          <ac:grpSpMkLst>
+            <pc:docMk/>
+            <pc:sldMk cId="1151188242" sldId="259"/>
+            <ac:grpSpMk id="29" creationId="{C46B9191-26A0-4FD4-8738-9A12E94157A1}"/>
+          </ac:grpSpMkLst>
+        </pc:grpChg>
+        <pc:grpChg chg="mod">
+          <ac:chgData name="Israelstudytrip" userId="b164cf87-9e27-483d-96be-d558d6a89ad0" providerId="ADAL" clId="{CBC2BE33-CB9D-4F41-A069-55FBA2E3D275}" dt="2020-12-27T20:53:45.107" v="663" actId="1037"/>
+          <ac:grpSpMkLst>
+            <pc:docMk/>
+            <pc:sldMk cId="1151188242" sldId="259"/>
+            <ac:grpSpMk id="32" creationId="{2D724FCC-F328-46BE-853A-8B1F7DBF66C8}"/>
+          </ac:grpSpMkLst>
+        </pc:grpChg>
+        <pc:grpChg chg="mod">
+          <ac:chgData name="Israelstudytrip" userId="b164cf87-9e27-483d-96be-d558d6a89ad0" providerId="ADAL" clId="{CBC2BE33-CB9D-4F41-A069-55FBA2E3D275}" dt="2020-12-27T20:53:24.437" v="629" actId="1038"/>
+          <ac:grpSpMkLst>
+            <pc:docMk/>
+            <pc:sldMk cId="1151188242" sldId="259"/>
+            <ac:grpSpMk id="50" creationId="{1009C8FE-6B48-4BE9-984A-4AF6BBBF44BD}"/>
+          </ac:grpSpMkLst>
+        </pc:grpChg>
+        <pc:picChg chg="add del mod modCrop">
+          <ac:chgData name="Israelstudytrip" userId="b164cf87-9e27-483d-96be-d558d6a89ad0" providerId="ADAL" clId="{CBC2BE33-CB9D-4F41-A069-55FBA2E3D275}" dt="2020-12-27T20:50:52.762" v="494" actId="478"/>
+          <ac:picMkLst>
+            <pc:docMk/>
+            <pc:sldMk cId="1151188242" sldId="259"/>
+            <ac:picMk id="3" creationId="{13105967-97A6-4B9F-B5E8-E3A10F1B9A41}"/>
+          </ac:picMkLst>
+        </pc:picChg>
+        <pc:picChg chg="del">
+          <ac:chgData name="Israelstudytrip" userId="b164cf87-9e27-483d-96be-d558d6a89ad0" providerId="ADAL" clId="{CBC2BE33-CB9D-4F41-A069-55FBA2E3D275}" dt="2020-12-23T07:12:08.384" v="204" actId="478"/>
+          <ac:picMkLst>
+            <pc:docMk/>
+            <pc:sldMk cId="1151188242" sldId="259"/>
+            <ac:picMk id="5" creationId="{645B28F2-C8E4-4E5E-93A9-EFB13DBCADF3}"/>
+          </ac:picMkLst>
+        </pc:picChg>
+        <pc:picChg chg="add mod modCrop">
+          <ac:chgData name="Israelstudytrip" userId="b164cf87-9e27-483d-96be-d558d6a89ad0" providerId="ADAL" clId="{CBC2BE33-CB9D-4F41-A069-55FBA2E3D275}" dt="2020-12-27T20:52:46.875" v="589" actId="14100"/>
+          <ac:picMkLst>
+            <pc:docMk/>
+            <pc:sldMk cId="1151188242" sldId="259"/>
+            <ac:picMk id="7" creationId="{2898A0A6-8B35-46B2-9C73-2B769C76E27C}"/>
+          </ac:picMkLst>
+        </pc:picChg>
+      </pc:sldChg>
+      <pc:sldChg chg="add">
+        <pc:chgData name="Israelstudytrip" userId="b164cf87-9e27-483d-96be-d558d6a89ad0" providerId="ADAL" clId="{CBC2BE33-CB9D-4F41-A069-55FBA2E3D275}" dt="2020-12-23T07:05:04.723" v="0"/>
+        <pc:sldMkLst>
+          <pc:docMk/>
+          <pc:sldMk cId="2021532856" sldId="260"/>
+        </pc:sldMkLst>
+      </pc:sldChg>
+      <pc:sldChg chg="add">
+        <pc:chgData name="Israelstudytrip" userId="b164cf87-9e27-483d-96be-d558d6a89ad0" providerId="ADAL" clId="{CBC2BE33-CB9D-4F41-A069-55FBA2E3D275}" dt="2020-12-23T07:05:04.723" v="0"/>
+        <pc:sldMkLst>
+          <pc:docMk/>
+          <pc:sldMk cId="4267351181" sldId="261"/>
+        </pc:sldMkLst>
+      </pc:sldChg>
+      <pc:sldChg chg="add">
+        <pc:chgData name="Israelstudytrip" userId="b164cf87-9e27-483d-96be-d558d6a89ad0" providerId="ADAL" clId="{CBC2BE33-CB9D-4F41-A069-55FBA2E3D275}" dt="2020-12-23T07:05:04.723" v="0"/>
+        <pc:sldMkLst>
+          <pc:docMk/>
+          <pc:sldMk cId="2939542715" sldId="262"/>
+        </pc:sldMkLst>
+      </pc:sldChg>
+      <pc:sldChg chg="add">
+        <pc:chgData name="Israelstudytrip" userId="b164cf87-9e27-483d-96be-d558d6a89ad0" providerId="ADAL" clId="{CBC2BE33-CB9D-4F41-A069-55FBA2E3D275}" dt="2020-12-23T07:05:04.723" v="0"/>
+        <pc:sldMkLst>
+          <pc:docMk/>
+          <pc:sldMk cId="3933128609" sldId="263"/>
+        </pc:sldMkLst>
+      </pc:sldChg>
+    </pc:docChg>
+  </pc:docChgLst>
 </pc:chgInfo>
 </file>
 
@@ -426,7 +743,7 @@
           <a:p>
             <a:fld id="{94C77411-B723-4FFA-B575-15E27B9FE784}" type="datetimeFigureOut">
               <a:rPr lang="en-US" smtClean="0"/>
-              <a:t>11/2/2020</a:t>
+              <a:t>12/22/2020</a:t>
             </a:fld>
             <a:endParaRPr lang="en-US"/>
           </a:p>
@@ -596,7 +913,7 @@
           <a:p>
             <a:fld id="{94C77411-B723-4FFA-B575-15E27B9FE784}" type="datetimeFigureOut">
               <a:rPr lang="en-US" smtClean="0"/>
-              <a:t>11/2/2020</a:t>
+              <a:t>12/22/2020</a:t>
             </a:fld>
             <a:endParaRPr lang="en-US"/>
           </a:p>
@@ -776,7 +1093,7 @@
           <a:p>
             <a:fld id="{94C77411-B723-4FFA-B575-15E27B9FE784}" type="datetimeFigureOut">
               <a:rPr lang="en-US" smtClean="0"/>
-              <a:t>11/2/2020</a:t>
+              <a:t>12/22/2020</a:t>
             </a:fld>
             <a:endParaRPr lang="en-US"/>
           </a:p>
@@ -946,7 +1263,7 @@
           <a:p>
             <a:fld id="{94C77411-B723-4FFA-B575-15E27B9FE784}" type="datetimeFigureOut">
               <a:rPr lang="en-US" smtClean="0"/>
-              <a:t>11/2/2020</a:t>
+              <a:t>12/22/2020</a:t>
             </a:fld>
             <a:endParaRPr lang="en-US"/>
           </a:p>
@@ -1190,7 +1507,7 @@
           <a:p>
             <a:fld id="{94C77411-B723-4FFA-B575-15E27B9FE784}" type="datetimeFigureOut">
               <a:rPr lang="en-US" smtClean="0"/>
-              <a:t>11/2/2020</a:t>
+              <a:t>12/22/2020</a:t>
             </a:fld>
             <a:endParaRPr lang="en-US"/>
           </a:p>
@@ -1422,7 +1739,7 @@
           <a:p>
             <a:fld id="{94C77411-B723-4FFA-B575-15E27B9FE784}" type="datetimeFigureOut">
               <a:rPr lang="en-US" smtClean="0"/>
-              <a:t>11/2/2020</a:t>
+              <a:t>12/22/2020</a:t>
             </a:fld>
             <a:endParaRPr lang="en-US"/>
           </a:p>
@@ -1789,7 +2106,7 @@
           <a:p>
             <a:fld id="{94C77411-B723-4FFA-B575-15E27B9FE784}" type="datetimeFigureOut">
               <a:rPr lang="en-US" smtClean="0"/>
-              <a:t>11/2/2020</a:t>
+              <a:t>12/22/2020</a:t>
             </a:fld>
             <a:endParaRPr lang="en-US"/>
           </a:p>
@@ -1907,7 +2224,7 @@
           <a:p>
             <a:fld id="{94C77411-B723-4FFA-B575-15E27B9FE784}" type="datetimeFigureOut">
               <a:rPr lang="en-US" smtClean="0"/>
-              <a:t>11/2/2020</a:t>
+              <a:t>12/22/2020</a:t>
             </a:fld>
             <a:endParaRPr lang="en-US"/>
           </a:p>
@@ -2002,7 +2319,7 @@
           <a:p>
             <a:fld id="{94C77411-B723-4FFA-B575-15E27B9FE784}" type="datetimeFigureOut">
               <a:rPr lang="en-US" smtClean="0"/>
-              <a:t>11/2/2020</a:t>
+              <a:t>12/22/2020</a:t>
             </a:fld>
             <a:endParaRPr lang="en-US"/>
           </a:p>
@@ -2279,7 +2596,7 @@
           <a:p>
             <a:fld id="{94C77411-B723-4FFA-B575-15E27B9FE784}" type="datetimeFigureOut">
               <a:rPr lang="en-US" smtClean="0"/>
-              <a:t>11/2/2020</a:t>
+              <a:t>12/22/2020</a:t>
             </a:fld>
             <a:endParaRPr lang="en-US"/>
           </a:p>
@@ -2536,7 +2853,7 @@
           <a:p>
             <a:fld id="{94C77411-B723-4FFA-B575-15E27B9FE784}" type="datetimeFigureOut">
               <a:rPr lang="en-US" smtClean="0"/>
-              <a:t>11/2/2020</a:t>
+              <a:t>12/22/2020</a:t>
             </a:fld>
             <a:endParaRPr lang="en-US"/>
           </a:p>
@@ -2749,7 +3066,7 @@
           <a:p>
             <a:fld id="{94C77411-B723-4FFA-B575-15E27B9FE784}" type="datetimeFigureOut">
               <a:rPr lang="en-US" smtClean="0"/>
-              <a:t>11/2/2020</a:t>
+              <a:t>12/22/2020</a:t>
             </a:fld>
             <a:endParaRPr lang="en-US"/>
           </a:p>
@@ -3183,6 +3500,2749 @@
             </a:r>
             <a:r>
               <a:rPr lang="en-US" sz="1200" dirty="0"/>
+              <a:t>Effects on equilibrium female share of the total applicant pool from gender differences in reapplication (</a:t>
+            </a:r>
+            <a:r>
+              <a:rPr lang="en-US" sz="1200" i="1" dirty="0"/>
+              <a:t>g</a:t>
+            </a:r>
+            <a:r>
+              <a:rPr lang="en-US" sz="1200" dirty="0"/>
+              <a:t>, horizontal axis) and the baseline (women’s) reapplication rate (</a:t>
+            </a:r>
+            <a:r>
+              <a:rPr lang="en-US" sz="1200" i="1" dirty="0"/>
+              <a:t>b</a:t>
+            </a:r>
+            <a:r>
+              <a:rPr lang="en-US" sz="1200" dirty="0"/>
+              <a:t>, vertical axis) plotted as a contour plot. The female share of first-time applicants (</a:t>
+            </a:r>
+            <a:r>
+              <a:rPr lang="en-US" sz="1200" i="1" dirty="0"/>
+              <a:t>p</a:t>
+            </a:r>
+            <a:r>
+              <a:rPr lang="en-US" sz="1200" dirty="0"/>
+              <a:t>) in the figure is 0.30, or 30%. The rejection rate experienced by all applicants (</a:t>
+            </a:r>
+            <a:r>
+              <a:rPr lang="en-US" sz="1200" i="1" dirty="0"/>
+              <a:t>r</a:t>
+            </a:r>
+            <a:r>
+              <a:rPr lang="en-US" sz="1200" dirty="0"/>
+              <a:t>) in this figure is 0.70, or 70%. Each contour line in the panel represents a 1 percentage point change (0.01) from the initial female share of first-time applicants (</a:t>
+            </a:r>
+            <a:r>
+              <a:rPr lang="en-US" sz="1200" i="1" dirty="0"/>
+              <a:t>p</a:t>
+            </a:r>
+            <a:r>
+              <a:rPr lang="en-US" sz="1200" dirty="0"/>
+              <a:t>=0.30). </a:t>
+            </a:r>
+          </a:p>
+        </p:txBody>
+      </p:sp>
+      <p:pic>
+        <p:nvPicPr>
+          <p:cNvPr id="6" name="Picture 5" descr="Chart&#10;&#10;Description automatically generated">
+            <a:extLst>
+              <a:ext uri="{FF2B5EF4-FFF2-40B4-BE49-F238E27FC236}">
+                <a16:creationId xmlns:a16="http://schemas.microsoft.com/office/drawing/2014/main" id="{E88B94E0-47CE-4760-9A8B-0FE2F304F62C}"/>
+              </a:ext>
+            </a:extLst>
+          </p:cNvPr>
+          <p:cNvPicPr>
+            <a:picLocks noChangeAspect="1"/>
+          </p:cNvPicPr>
+          <p:nvPr/>
+        </p:nvPicPr>
+        <p:blipFill rotWithShape="1">
+          <a:blip r:embed="rId2">
+            <a:extLst>
+              <a:ext uri="{28A0092B-C50C-407E-A947-70E740481C1C}">
+                <a14:useLocalDpi xmlns:a14="http://schemas.microsoft.com/office/drawing/2010/main" val="0"/>
+              </a:ext>
+            </a:extLst>
+          </a:blip>
+          <a:srcRect t="4484" r="1530"/>
+          <a:stretch/>
+        </p:blipFill>
+        <p:spPr>
+          <a:xfrm>
+            <a:off x="1238250" y="1478071"/>
+            <a:ext cx="6565465" cy="4094054"/>
+          </a:xfrm>
+          <a:prstGeom prst="rect">
+            <a:avLst/>
+          </a:prstGeom>
+        </p:spPr>
+      </p:pic>
+    </p:spTree>
+    <p:extLst>
+      <p:ext uri="{BB962C8B-B14F-4D97-AF65-F5344CB8AC3E}">
+        <p14:creationId xmlns:p14="http://schemas.microsoft.com/office/powerpoint/2010/main" val="329367528"/>
+      </p:ext>
+    </p:extLst>
+  </p:cSld>
+  <p:clrMapOvr>
+    <a:masterClrMapping/>
+  </p:clrMapOvr>
+</p:sld>
+</file>
+
+<file path=ppt/slides/slide2.xml><?xml version="1.0" encoding="utf-8"?>
+<p:sld xmlns:a="http://schemas.openxmlformats.org/drawingml/2006/main" xmlns:r="http://schemas.openxmlformats.org/officeDocument/2006/relationships" xmlns:p="http://schemas.openxmlformats.org/presentationml/2006/main">
+  <p:cSld>
+    <p:spTree>
+      <p:nvGrpSpPr>
+        <p:cNvPr id="1" name=""/>
+        <p:cNvGrpSpPr/>
+        <p:nvPr/>
+      </p:nvGrpSpPr>
+      <p:grpSpPr>
+        <a:xfrm>
+          <a:off x="0" y="0"/>
+          <a:ext cx="0" cy="0"/>
+          <a:chOff x="0" y="0"/>
+          <a:chExt cx="0" cy="0"/>
+        </a:xfrm>
+      </p:grpSpPr>
+      <p:sp>
+        <p:nvSpPr>
+          <p:cNvPr id="4" name="Title 3">
+            <a:extLst>
+              <a:ext uri="{FF2B5EF4-FFF2-40B4-BE49-F238E27FC236}">
+                <a16:creationId xmlns:a16="http://schemas.microsoft.com/office/drawing/2014/main" id="{EBC4ABCE-05FA-4150-AE99-F6545909F115}"/>
+              </a:ext>
+            </a:extLst>
+          </p:cNvPr>
+          <p:cNvSpPr>
+            <a:spLocks noGrp="1"/>
+          </p:cNvSpPr>
+          <p:nvPr>
+            <p:ph type="title"/>
+          </p:nvPr>
+        </p:nvSpPr>
+        <p:spPr/>
+        <p:txBody>
+          <a:bodyPr>
+            <a:normAutofit/>
+          </a:bodyPr>
+          <a:lstStyle/>
+          <a:p>
+            <a:r>
+              <a:rPr lang="en-US" sz="1200" b="1" dirty="0"/>
+              <a:t>Figure 3. </a:t>
+            </a:r>
+            <a:r>
+              <a:rPr lang="en-US" sz="1200" dirty="0"/>
+              <a:t>Effects on equilibrium female share of the total applicant pool from gender differences in reapplication (</a:t>
+            </a:r>
+            <a:r>
+              <a:rPr lang="en-US" sz="1200" i="1" dirty="0"/>
+              <a:t>g</a:t>
+            </a:r>
+            <a:r>
+              <a:rPr lang="en-US" sz="1200" dirty="0"/>
+              <a:t>) and the three other model parameters: baseline (women’s) reapplication rate (</a:t>
+            </a:r>
+            <a:r>
+              <a:rPr lang="en-US" sz="1200" i="1" dirty="0"/>
+              <a:t>b</a:t>
+            </a:r>
+            <a:r>
+              <a:rPr lang="en-US" sz="1200" dirty="0"/>
+              <a:t>), female share of first-time applicants (</a:t>
+            </a:r>
+            <a:r>
+              <a:rPr lang="en-US" sz="1200" i="1" dirty="0"/>
+              <a:t>p</a:t>
+            </a:r>
+            <a:r>
+              <a:rPr lang="en-US" sz="1200" dirty="0"/>
+              <a:t>), and rejection rate experienced by all applicants (</a:t>
+            </a:r>
+            <a:r>
+              <a:rPr lang="en-US" sz="1200" i="1" dirty="0"/>
+              <a:t>r</a:t>
+            </a:r>
+            <a:r>
+              <a:rPr lang="en-US" sz="1200" dirty="0"/>
+              <a:t>). Each row of panels has the same rejection rate (</a:t>
+            </a:r>
+            <a:r>
+              <a:rPr lang="en-US" sz="1200" i="1" dirty="0"/>
+              <a:t>r</a:t>
+            </a:r>
+            <a:r>
+              <a:rPr lang="en-US" sz="1200" dirty="0"/>
+              <a:t>). Each column of panels has the same female share of first-time applicants (</a:t>
+            </a:r>
+            <a:r>
+              <a:rPr lang="en-US" sz="1200" i="1" dirty="0"/>
+              <a:t>p</a:t>
+            </a:r>
+            <a:r>
+              <a:rPr lang="en-US" sz="1200" dirty="0"/>
+              <a:t>). Each contour line in the panels represents a 1 percentage point change (0.01) from the initial female share of first-time applicants (</a:t>
+            </a:r>
+            <a:r>
+              <a:rPr lang="en-US" sz="1200" i="1" dirty="0"/>
+              <a:t>p</a:t>
+            </a:r>
+            <a:r>
+              <a:rPr lang="en-US" sz="1200" dirty="0"/>
+              <a:t>) for the panel. </a:t>
+            </a:r>
+          </a:p>
+        </p:txBody>
+      </p:sp>
+      <p:grpSp>
+        <p:nvGrpSpPr>
+          <p:cNvPr id="8" name="Group 7">
+            <a:extLst>
+              <a:ext uri="{FF2B5EF4-FFF2-40B4-BE49-F238E27FC236}">
+                <a16:creationId xmlns:a16="http://schemas.microsoft.com/office/drawing/2014/main" id="{EB680435-D864-43D8-84E6-8CF7364F299E}"/>
+              </a:ext>
+            </a:extLst>
+          </p:cNvPr>
+          <p:cNvGrpSpPr/>
+          <p:nvPr/>
+        </p:nvGrpSpPr>
+        <p:grpSpPr>
+          <a:xfrm>
+            <a:off x="846959" y="4161364"/>
+            <a:ext cx="553998" cy="585093"/>
+            <a:chOff x="1879602" y="5615517"/>
+            <a:chExt cx="553998" cy="1028700"/>
+          </a:xfrm>
+        </p:grpSpPr>
+        <p:cxnSp>
+          <p:nvCxnSpPr>
+            <p:cNvPr id="9" name="Straight Arrow Connector 8">
+              <a:extLst>
+                <a:ext uri="{FF2B5EF4-FFF2-40B4-BE49-F238E27FC236}">
+                  <a16:creationId xmlns:a16="http://schemas.microsoft.com/office/drawing/2014/main" id="{7B321110-BFDB-4E74-BACE-01430F377389}"/>
+                </a:ext>
+              </a:extLst>
+            </p:cNvPr>
+            <p:cNvCxnSpPr>
+              <a:cxnSpLocks/>
+            </p:cNvCxnSpPr>
+            <p:nvPr/>
+          </p:nvCxnSpPr>
+          <p:spPr>
+            <a:xfrm rot="16200000">
+              <a:off x="1824567" y="6129867"/>
+              <a:ext cx="1028700" cy="0"/>
+            </a:xfrm>
+            <a:prstGeom prst="straightConnector1">
+              <a:avLst/>
+            </a:prstGeom>
+            <a:ln>
+              <a:tailEnd type="triangle"/>
+            </a:ln>
+          </p:spPr>
+          <p:style>
+            <a:lnRef idx="1">
+              <a:schemeClr val="accent1"/>
+            </a:lnRef>
+            <a:fillRef idx="0">
+              <a:schemeClr val="accent1"/>
+            </a:fillRef>
+            <a:effectRef idx="0">
+              <a:schemeClr val="accent1"/>
+            </a:effectRef>
+            <a:fontRef idx="minor">
+              <a:schemeClr val="tx1"/>
+            </a:fontRef>
+          </p:style>
+        </p:cxnSp>
+        <p:sp>
+          <p:nvSpPr>
+            <p:cNvPr id="10" name="TextBox 9">
+              <a:extLst>
+                <a:ext uri="{FF2B5EF4-FFF2-40B4-BE49-F238E27FC236}">
+                  <a16:creationId xmlns:a16="http://schemas.microsoft.com/office/drawing/2014/main" id="{DB2835C7-A9A9-4256-96A7-EB582AE04AAD}"/>
+                </a:ext>
+              </a:extLst>
+            </p:cNvPr>
+            <p:cNvSpPr txBox="1"/>
+            <p:nvPr/>
+          </p:nvSpPr>
+          <p:spPr>
+            <a:xfrm>
+              <a:off x="1879602" y="5615517"/>
+              <a:ext cx="553998" cy="1028698"/>
+            </a:xfrm>
+            <a:prstGeom prst="rect">
+              <a:avLst/>
+            </a:prstGeom>
+            <a:noFill/>
+          </p:spPr>
+          <p:txBody>
+            <a:bodyPr vert="vert270" wrap="square" rtlCol="0">
+              <a:spAutoFit/>
+            </a:bodyPr>
+            <a:lstStyle/>
+            <a:p>
+              <a:pPr algn="ctr"/>
+              <a:r>
+                <a:rPr lang="en-US" sz="1200" i="1" dirty="0"/>
+                <a:t>r</a:t>
+              </a:r>
+              <a:r>
+                <a:rPr lang="en-US" sz="1200" dirty="0"/>
+                <a:t>=0.70</a:t>
+              </a:r>
+              <a:endParaRPr lang="en-US" sz="1200" i="1" dirty="0"/>
+            </a:p>
+            <a:p>
+              <a:pPr algn="ctr"/>
+              <a:r>
+                <a:rPr lang="en-US" sz="1200" i="1" dirty="0"/>
+                <a:t>b</a:t>
+              </a:r>
+            </a:p>
+          </p:txBody>
+        </p:sp>
+      </p:grpSp>
+      <p:grpSp>
+        <p:nvGrpSpPr>
+          <p:cNvPr id="11" name="Group 10">
+            <a:extLst>
+              <a:ext uri="{FF2B5EF4-FFF2-40B4-BE49-F238E27FC236}">
+                <a16:creationId xmlns:a16="http://schemas.microsoft.com/office/drawing/2014/main" id="{82F48F8C-ED1B-429D-BA28-3B074641772F}"/>
+              </a:ext>
+            </a:extLst>
+          </p:cNvPr>
+          <p:cNvGrpSpPr/>
+          <p:nvPr/>
+        </p:nvGrpSpPr>
+        <p:grpSpPr>
+          <a:xfrm>
+            <a:off x="846959" y="4898968"/>
+            <a:ext cx="553998" cy="651176"/>
+            <a:chOff x="1879602" y="5615517"/>
+            <a:chExt cx="553998" cy="1028700"/>
+          </a:xfrm>
+        </p:grpSpPr>
+        <p:cxnSp>
+          <p:nvCxnSpPr>
+            <p:cNvPr id="12" name="Straight Arrow Connector 11">
+              <a:extLst>
+                <a:ext uri="{FF2B5EF4-FFF2-40B4-BE49-F238E27FC236}">
+                  <a16:creationId xmlns:a16="http://schemas.microsoft.com/office/drawing/2014/main" id="{F3E39858-BA6D-4712-AEC1-79F063E60A82}"/>
+                </a:ext>
+              </a:extLst>
+            </p:cNvPr>
+            <p:cNvCxnSpPr>
+              <a:cxnSpLocks/>
+            </p:cNvCxnSpPr>
+            <p:nvPr/>
+          </p:nvCxnSpPr>
+          <p:spPr>
+            <a:xfrm rot="16200000">
+              <a:off x="1824567" y="6129867"/>
+              <a:ext cx="1028700" cy="0"/>
+            </a:xfrm>
+            <a:prstGeom prst="straightConnector1">
+              <a:avLst/>
+            </a:prstGeom>
+            <a:ln>
+              <a:tailEnd type="triangle"/>
+            </a:ln>
+          </p:spPr>
+          <p:style>
+            <a:lnRef idx="1">
+              <a:schemeClr val="accent1"/>
+            </a:lnRef>
+            <a:fillRef idx="0">
+              <a:schemeClr val="accent1"/>
+            </a:fillRef>
+            <a:effectRef idx="0">
+              <a:schemeClr val="accent1"/>
+            </a:effectRef>
+            <a:fontRef idx="minor">
+              <a:schemeClr val="tx1"/>
+            </a:fontRef>
+          </p:style>
+        </p:cxnSp>
+        <p:sp>
+          <p:nvSpPr>
+            <p:cNvPr id="13" name="TextBox 12">
+              <a:extLst>
+                <a:ext uri="{FF2B5EF4-FFF2-40B4-BE49-F238E27FC236}">
+                  <a16:creationId xmlns:a16="http://schemas.microsoft.com/office/drawing/2014/main" id="{2FFFC94D-8DB2-40DA-A433-3D2945A0DCF8}"/>
+                </a:ext>
+              </a:extLst>
+            </p:cNvPr>
+            <p:cNvSpPr txBox="1"/>
+            <p:nvPr/>
+          </p:nvSpPr>
+          <p:spPr>
+            <a:xfrm>
+              <a:off x="1879602" y="5615517"/>
+              <a:ext cx="553998" cy="1028698"/>
+            </a:xfrm>
+            <a:prstGeom prst="rect">
+              <a:avLst/>
+            </a:prstGeom>
+            <a:noFill/>
+          </p:spPr>
+          <p:txBody>
+            <a:bodyPr vert="vert270" wrap="square" rtlCol="0">
+              <a:spAutoFit/>
+            </a:bodyPr>
+            <a:lstStyle/>
+            <a:p>
+              <a:pPr algn="ctr"/>
+              <a:r>
+                <a:rPr lang="en-US" sz="1200" i="1" dirty="0"/>
+                <a:t>r</a:t>
+              </a:r>
+              <a:r>
+                <a:rPr lang="en-US" sz="1200" dirty="0"/>
+                <a:t>=0.90</a:t>
+              </a:r>
+              <a:endParaRPr lang="en-US" sz="1200" i="1" dirty="0"/>
+            </a:p>
+            <a:p>
+              <a:pPr algn="ctr"/>
+              <a:r>
+                <a:rPr lang="en-US" sz="1200" i="1" dirty="0"/>
+                <a:t>b</a:t>
+              </a:r>
+            </a:p>
+          </p:txBody>
+        </p:sp>
+      </p:grpSp>
+      <p:grpSp>
+        <p:nvGrpSpPr>
+          <p:cNvPr id="14" name="Group 13">
+            <a:extLst>
+              <a:ext uri="{FF2B5EF4-FFF2-40B4-BE49-F238E27FC236}">
+                <a16:creationId xmlns:a16="http://schemas.microsoft.com/office/drawing/2014/main" id="{9B7BBCB2-2813-4093-B30E-099E2895746D}"/>
+              </a:ext>
+            </a:extLst>
+          </p:cNvPr>
+          <p:cNvGrpSpPr/>
+          <p:nvPr/>
+        </p:nvGrpSpPr>
+        <p:grpSpPr>
+          <a:xfrm>
+            <a:off x="846959" y="3423759"/>
+            <a:ext cx="553998" cy="585093"/>
+            <a:chOff x="1879602" y="5615517"/>
+            <a:chExt cx="553998" cy="1028700"/>
+          </a:xfrm>
+        </p:grpSpPr>
+        <p:cxnSp>
+          <p:nvCxnSpPr>
+            <p:cNvPr id="15" name="Straight Arrow Connector 14">
+              <a:extLst>
+                <a:ext uri="{FF2B5EF4-FFF2-40B4-BE49-F238E27FC236}">
+                  <a16:creationId xmlns:a16="http://schemas.microsoft.com/office/drawing/2014/main" id="{CB90CCDA-C4D6-459F-90D1-7E817E81DDB0}"/>
+                </a:ext>
+              </a:extLst>
+            </p:cNvPr>
+            <p:cNvCxnSpPr>
+              <a:cxnSpLocks/>
+            </p:cNvCxnSpPr>
+            <p:nvPr/>
+          </p:nvCxnSpPr>
+          <p:spPr>
+            <a:xfrm rot="16200000">
+              <a:off x="1824567" y="6129867"/>
+              <a:ext cx="1028700" cy="0"/>
+            </a:xfrm>
+            <a:prstGeom prst="straightConnector1">
+              <a:avLst/>
+            </a:prstGeom>
+            <a:ln>
+              <a:tailEnd type="triangle"/>
+            </a:ln>
+          </p:spPr>
+          <p:style>
+            <a:lnRef idx="1">
+              <a:schemeClr val="accent1"/>
+            </a:lnRef>
+            <a:fillRef idx="0">
+              <a:schemeClr val="accent1"/>
+            </a:fillRef>
+            <a:effectRef idx="0">
+              <a:schemeClr val="accent1"/>
+            </a:effectRef>
+            <a:fontRef idx="minor">
+              <a:schemeClr val="tx1"/>
+            </a:fontRef>
+          </p:style>
+        </p:cxnSp>
+        <p:sp>
+          <p:nvSpPr>
+            <p:cNvPr id="16" name="TextBox 15">
+              <a:extLst>
+                <a:ext uri="{FF2B5EF4-FFF2-40B4-BE49-F238E27FC236}">
+                  <a16:creationId xmlns:a16="http://schemas.microsoft.com/office/drawing/2014/main" id="{84C8D05E-F3C8-4BAB-B185-5CC79BA20C64}"/>
+                </a:ext>
+              </a:extLst>
+            </p:cNvPr>
+            <p:cNvSpPr txBox="1"/>
+            <p:nvPr/>
+          </p:nvSpPr>
+          <p:spPr>
+            <a:xfrm>
+              <a:off x="1879602" y="5615517"/>
+              <a:ext cx="553998" cy="1028698"/>
+            </a:xfrm>
+            <a:prstGeom prst="rect">
+              <a:avLst/>
+            </a:prstGeom>
+            <a:noFill/>
+          </p:spPr>
+          <p:txBody>
+            <a:bodyPr vert="vert270" wrap="square" rtlCol="0">
+              <a:spAutoFit/>
+            </a:bodyPr>
+            <a:lstStyle/>
+            <a:p>
+              <a:pPr algn="ctr"/>
+              <a:r>
+                <a:rPr lang="en-US" sz="1200" i="1" dirty="0"/>
+                <a:t>r</a:t>
+              </a:r>
+              <a:r>
+                <a:rPr lang="en-US" sz="1200" dirty="0"/>
+                <a:t>=0.50</a:t>
+              </a:r>
+              <a:endParaRPr lang="en-US" sz="1200" i="1" dirty="0"/>
+            </a:p>
+            <a:p>
+              <a:pPr algn="ctr"/>
+              <a:r>
+                <a:rPr lang="en-US" sz="1200" i="1" dirty="0"/>
+                <a:t>b</a:t>
+              </a:r>
+            </a:p>
+          </p:txBody>
+        </p:sp>
+      </p:grpSp>
+      <p:grpSp>
+        <p:nvGrpSpPr>
+          <p:cNvPr id="17" name="Group 16">
+            <a:extLst>
+              <a:ext uri="{FF2B5EF4-FFF2-40B4-BE49-F238E27FC236}">
+                <a16:creationId xmlns:a16="http://schemas.microsoft.com/office/drawing/2014/main" id="{F4643504-41A1-426C-9F3F-14AE99D113E4}"/>
+              </a:ext>
+            </a:extLst>
+          </p:cNvPr>
+          <p:cNvGrpSpPr/>
+          <p:nvPr/>
+        </p:nvGrpSpPr>
+        <p:grpSpPr>
+          <a:xfrm>
+            <a:off x="846959" y="2725096"/>
+            <a:ext cx="553998" cy="585093"/>
+            <a:chOff x="1879602" y="5615517"/>
+            <a:chExt cx="553998" cy="1028700"/>
+          </a:xfrm>
+        </p:grpSpPr>
+        <p:cxnSp>
+          <p:nvCxnSpPr>
+            <p:cNvPr id="18" name="Straight Arrow Connector 17">
+              <a:extLst>
+                <a:ext uri="{FF2B5EF4-FFF2-40B4-BE49-F238E27FC236}">
+                  <a16:creationId xmlns:a16="http://schemas.microsoft.com/office/drawing/2014/main" id="{EEFCA324-5A6E-4440-B164-07DAB55AB751}"/>
+                </a:ext>
+              </a:extLst>
+            </p:cNvPr>
+            <p:cNvCxnSpPr>
+              <a:cxnSpLocks/>
+            </p:cNvCxnSpPr>
+            <p:nvPr/>
+          </p:nvCxnSpPr>
+          <p:spPr>
+            <a:xfrm rot="16200000">
+              <a:off x="1824567" y="6129867"/>
+              <a:ext cx="1028700" cy="0"/>
+            </a:xfrm>
+            <a:prstGeom prst="straightConnector1">
+              <a:avLst/>
+            </a:prstGeom>
+            <a:ln>
+              <a:tailEnd type="triangle"/>
+            </a:ln>
+          </p:spPr>
+          <p:style>
+            <a:lnRef idx="1">
+              <a:schemeClr val="accent1"/>
+            </a:lnRef>
+            <a:fillRef idx="0">
+              <a:schemeClr val="accent1"/>
+            </a:fillRef>
+            <a:effectRef idx="0">
+              <a:schemeClr val="accent1"/>
+            </a:effectRef>
+            <a:fontRef idx="minor">
+              <a:schemeClr val="tx1"/>
+            </a:fontRef>
+          </p:style>
+        </p:cxnSp>
+        <p:sp>
+          <p:nvSpPr>
+            <p:cNvPr id="19" name="TextBox 18">
+              <a:extLst>
+                <a:ext uri="{FF2B5EF4-FFF2-40B4-BE49-F238E27FC236}">
+                  <a16:creationId xmlns:a16="http://schemas.microsoft.com/office/drawing/2014/main" id="{C9A2647F-AB6C-4730-AF89-6C9A2445C91C}"/>
+                </a:ext>
+              </a:extLst>
+            </p:cNvPr>
+            <p:cNvSpPr txBox="1"/>
+            <p:nvPr/>
+          </p:nvSpPr>
+          <p:spPr>
+            <a:xfrm>
+              <a:off x="1879602" y="5615517"/>
+              <a:ext cx="553998" cy="1028698"/>
+            </a:xfrm>
+            <a:prstGeom prst="rect">
+              <a:avLst/>
+            </a:prstGeom>
+            <a:noFill/>
+          </p:spPr>
+          <p:txBody>
+            <a:bodyPr vert="vert270" wrap="square" rtlCol="0">
+              <a:spAutoFit/>
+            </a:bodyPr>
+            <a:lstStyle/>
+            <a:p>
+              <a:pPr algn="ctr"/>
+              <a:r>
+                <a:rPr lang="en-US" sz="1200" i="1" dirty="0"/>
+                <a:t>r</a:t>
+              </a:r>
+              <a:r>
+                <a:rPr lang="en-US" sz="1200" dirty="0"/>
+                <a:t>=0.30</a:t>
+              </a:r>
+              <a:endParaRPr lang="en-US" sz="1200" i="1" dirty="0"/>
+            </a:p>
+            <a:p>
+              <a:pPr algn="ctr"/>
+              <a:r>
+                <a:rPr lang="en-US" sz="1200" i="1" dirty="0"/>
+                <a:t>b</a:t>
+              </a:r>
+            </a:p>
+          </p:txBody>
+        </p:sp>
+      </p:grpSp>
+      <p:grpSp>
+        <p:nvGrpSpPr>
+          <p:cNvPr id="20" name="Group 19">
+            <a:extLst>
+              <a:ext uri="{FF2B5EF4-FFF2-40B4-BE49-F238E27FC236}">
+                <a16:creationId xmlns:a16="http://schemas.microsoft.com/office/drawing/2014/main" id="{5E76780C-F08A-405F-AFE7-73BB7408DDF8}"/>
+              </a:ext>
+            </a:extLst>
+          </p:cNvPr>
+          <p:cNvGrpSpPr/>
+          <p:nvPr/>
+        </p:nvGrpSpPr>
+        <p:grpSpPr>
+          <a:xfrm>
+            <a:off x="846959" y="1971279"/>
+            <a:ext cx="553998" cy="585093"/>
+            <a:chOff x="1879602" y="5615517"/>
+            <a:chExt cx="553998" cy="1028700"/>
+          </a:xfrm>
+        </p:grpSpPr>
+        <p:cxnSp>
+          <p:nvCxnSpPr>
+            <p:cNvPr id="21" name="Straight Arrow Connector 20">
+              <a:extLst>
+                <a:ext uri="{FF2B5EF4-FFF2-40B4-BE49-F238E27FC236}">
+                  <a16:creationId xmlns:a16="http://schemas.microsoft.com/office/drawing/2014/main" id="{5C986784-9743-4496-B87D-D91E8E564C05}"/>
+                </a:ext>
+              </a:extLst>
+            </p:cNvPr>
+            <p:cNvCxnSpPr>
+              <a:cxnSpLocks/>
+            </p:cNvCxnSpPr>
+            <p:nvPr/>
+          </p:nvCxnSpPr>
+          <p:spPr>
+            <a:xfrm rot="16200000">
+              <a:off x="1824567" y="6129867"/>
+              <a:ext cx="1028700" cy="0"/>
+            </a:xfrm>
+            <a:prstGeom prst="straightConnector1">
+              <a:avLst/>
+            </a:prstGeom>
+            <a:ln>
+              <a:tailEnd type="triangle"/>
+            </a:ln>
+          </p:spPr>
+          <p:style>
+            <a:lnRef idx="1">
+              <a:schemeClr val="accent1"/>
+            </a:lnRef>
+            <a:fillRef idx="0">
+              <a:schemeClr val="accent1"/>
+            </a:fillRef>
+            <a:effectRef idx="0">
+              <a:schemeClr val="accent1"/>
+            </a:effectRef>
+            <a:fontRef idx="minor">
+              <a:schemeClr val="tx1"/>
+            </a:fontRef>
+          </p:style>
+        </p:cxnSp>
+        <p:sp>
+          <p:nvSpPr>
+            <p:cNvPr id="22" name="TextBox 21">
+              <a:extLst>
+                <a:ext uri="{FF2B5EF4-FFF2-40B4-BE49-F238E27FC236}">
+                  <a16:creationId xmlns:a16="http://schemas.microsoft.com/office/drawing/2014/main" id="{F693BF43-B383-4EF4-A896-86B70FDA3D57}"/>
+                </a:ext>
+              </a:extLst>
+            </p:cNvPr>
+            <p:cNvSpPr txBox="1"/>
+            <p:nvPr/>
+          </p:nvSpPr>
+          <p:spPr>
+            <a:xfrm>
+              <a:off x="1879602" y="5615517"/>
+              <a:ext cx="553998" cy="1028698"/>
+            </a:xfrm>
+            <a:prstGeom prst="rect">
+              <a:avLst/>
+            </a:prstGeom>
+            <a:noFill/>
+          </p:spPr>
+          <p:txBody>
+            <a:bodyPr vert="vert270" wrap="square" rtlCol="0">
+              <a:spAutoFit/>
+            </a:bodyPr>
+            <a:lstStyle/>
+            <a:p>
+              <a:pPr algn="ctr"/>
+              <a:r>
+                <a:rPr lang="en-US" sz="1200" i="1" dirty="0"/>
+                <a:t>r</a:t>
+              </a:r>
+              <a:r>
+                <a:rPr lang="en-US" sz="1200" dirty="0"/>
+                <a:t>=0.10</a:t>
+              </a:r>
+              <a:endParaRPr lang="en-US" sz="1200" i="1" dirty="0"/>
+            </a:p>
+            <a:p>
+              <a:pPr algn="ctr"/>
+              <a:r>
+                <a:rPr lang="en-US" sz="1200" i="1" dirty="0"/>
+                <a:t>b</a:t>
+              </a:r>
+            </a:p>
+          </p:txBody>
+        </p:sp>
+      </p:grpSp>
+      <p:grpSp>
+        <p:nvGrpSpPr>
+          <p:cNvPr id="23" name="Group 22">
+            <a:extLst>
+              <a:ext uri="{FF2B5EF4-FFF2-40B4-BE49-F238E27FC236}">
+                <a16:creationId xmlns:a16="http://schemas.microsoft.com/office/drawing/2014/main" id="{DE76CB12-BB74-4BAC-A0FC-AF8A182A4D8D}"/>
+              </a:ext>
+            </a:extLst>
+          </p:cNvPr>
+          <p:cNvGrpSpPr/>
+          <p:nvPr/>
+        </p:nvGrpSpPr>
+        <p:grpSpPr>
+          <a:xfrm>
+            <a:off x="1708870" y="5831071"/>
+            <a:ext cx="1028701" cy="461665"/>
+            <a:chOff x="1824566" y="6032498"/>
+            <a:chExt cx="1028701" cy="461665"/>
+          </a:xfrm>
+        </p:grpSpPr>
+        <p:cxnSp>
+          <p:nvCxnSpPr>
+            <p:cNvPr id="24" name="Straight Arrow Connector 23">
+              <a:extLst>
+                <a:ext uri="{FF2B5EF4-FFF2-40B4-BE49-F238E27FC236}">
+                  <a16:creationId xmlns:a16="http://schemas.microsoft.com/office/drawing/2014/main" id="{DFAFE287-9021-4E77-8B95-E27CBABBB686}"/>
+                </a:ext>
+              </a:extLst>
+            </p:cNvPr>
+            <p:cNvCxnSpPr/>
+            <p:nvPr/>
+          </p:nvCxnSpPr>
+          <p:spPr>
+            <a:xfrm>
+              <a:off x="1824567" y="6129867"/>
+              <a:ext cx="1028700" cy="0"/>
+            </a:xfrm>
+            <a:prstGeom prst="straightConnector1">
+              <a:avLst/>
+            </a:prstGeom>
+            <a:ln>
+              <a:tailEnd type="triangle"/>
+            </a:ln>
+          </p:spPr>
+          <p:style>
+            <a:lnRef idx="1">
+              <a:schemeClr val="accent1"/>
+            </a:lnRef>
+            <a:fillRef idx="0">
+              <a:schemeClr val="accent1"/>
+            </a:fillRef>
+            <a:effectRef idx="0">
+              <a:schemeClr val="accent1"/>
+            </a:effectRef>
+            <a:fontRef idx="minor">
+              <a:schemeClr val="tx1"/>
+            </a:fontRef>
+          </p:style>
+        </p:cxnSp>
+        <p:sp>
+          <p:nvSpPr>
+            <p:cNvPr id="25" name="TextBox 24">
+              <a:extLst>
+                <a:ext uri="{FF2B5EF4-FFF2-40B4-BE49-F238E27FC236}">
+                  <a16:creationId xmlns:a16="http://schemas.microsoft.com/office/drawing/2014/main" id="{9419C4FA-59DF-47CE-956F-FA55F90D3DDF}"/>
+                </a:ext>
+              </a:extLst>
+            </p:cNvPr>
+            <p:cNvSpPr txBox="1"/>
+            <p:nvPr/>
+          </p:nvSpPr>
+          <p:spPr>
+            <a:xfrm>
+              <a:off x="1824566" y="6032498"/>
+              <a:ext cx="1024468" cy="461665"/>
+            </a:xfrm>
+            <a:prstGeom prst="rect">
+              <a:avLst/>
+            </a:prstGeom>
+            <a:noFill/>
+          </p:spPr>
+          <p:txBody>
+            <a:bodyPr wrap="square" rtlCol="0">
+              <a:spAutoFit/>
+            </a:bodyPr>
+            <a:lstStyle/>
+            <a:p>
+              <a:pPr algn="ctr"/>
+              <a:r>
+                <a:rPr lang="en-US" sz="1200" i="1" dirty="0"/>
+                <a:t>g</a:t>
+              </a:r>
+            </a:p>
+            <a:p>
+              <a:pPr algn="ctr"/>
+              <a:r>
+                <a:rPr lang="en-US" sz="1200" i="1" dirty="0"/>
+                <a:t>p</a:t>
+              </a:r>
+              <a:r>
+                <a:rPr lang="en-US" sz="1200" dirty="0"/>
+                <a:t>=0.10</a:t>
+              </a:r>
+            </a:p>
+          </p:txBody>
+        </p:sp>
+      </p:grpSp>
+      <p:grpSp>
+        <p:nvGrpSpPr>
+          <p:cNvPr id="26" name="Group 25">
+            <a:extLst>
+              <a:ext uri="{FF2B5EF4-FFF2-40B4-BE49-F238E27FC236}">
+                <a16:creationId xmlns:a16="http://schemas.microsoft.com/office/drawing/2014/main" id="{88BEC52C-3EB7-4AA0-B716-B68565DD7DE2}"/>
+              </a:ext>
+            </a:extLst>
+          </p:cNvPr>
+          <p:cNvGrpSpPr/>
+          <p:nvPr/>
+        </p:nvGrpSpPr>
+        <p:grpSpPr>
+          <a:xfrm>
+            <a:off x="3016970" y="5831070"/>
+            <a:ext cx="1028701" cy="461665"/>
+            <a:chOff x="1824566" y="6032498"/>
+            <a:chExt cx="1028701" cy="461665"/>
+          </a:xfrm>
+        </p:grpSpPr>
+        <p:cxnSp>
+          <p:nvCxnSpPr>
+            <p:cNvPr id="27" name="Straight Arrow Connector 26">
+              <a:extLst>
+                <a:ext uri="{FF2B5EF4-FFF2-40B4-BE49-F238E27FC236}">
+                  <a16:creationId xmlns:a16="http://schemas.microsoft.com/office/drawing/2014/main" id="{304035CF-1AC9-4985-91A8-F605D9F18D45}"/>
+                </a:ext>
+              </a:extLst>
+            </p:cNvPr>
+            <p:cNvCxnSpPr/>
+            <p:nvPr/>
+          </p:nvCxnSpPr>
+          <p:spPr>
+            <a:xfrm>
+              <a:off x="1824567" y="6129867"/>
+              <a:ext cx="1028700" cy="0"/>
+            </a:xfrm>
+            <a:prstGeom prst="straightConnector1">
+              <a:avLst/>
+            </a:prstGeom>
+            <a:ln>
+              <a:tailEnd type="triangle"/>
+            </a:ln>
+          </p:spPr>
+          <p:style>
+            <a:lnRef idx="1">
+              <a:schemeClr val="accent1"/>
+            </a:lnRef>
+            <a:fillRef idx="0">
+              <a:schemeClr val="accent1"/>
+            </a:fillRef>
+            <a:effectRef idx="0">
+              <a:schemeClr val="accent1"/>
+            </a:effectRef>
+            <a:fontRef idx="minor">
+              <a:schemeClr val="tx1"/>
+            </a:fontRef>
+          </p:style>
+        </p:cxnSp>
+        <p:sp>
+          <p:nvSpPr>
+            <p:cNvPr id="28" name="TextBox 27">
+              <a:extLst>
+                <a:ext uri="{FF2B5EF4-FFF2-40B4-BE49-F238E27FC236}">
+                  <a16:creationId xmlns:a16="http://schemas.microsoft.com/office/drawing/2014/main" id="{8381355F-EB61-437A-A3AC-161E578C2DAC}"/>
+                </a:ext>
+              </a:extLst>
+            </p:cNvPr>
+            <p:cNvSpPr txBox="1"/>
+            <p:nvPr/>
+          </p:nvSpPr>
+          <p:spPr>
+            <a:xfrm>
+              <a:off x="1824566" y="6032498"/>
+              <a:ext cx="1024468" cy="461665"/>
+            </a:xfrm>
+            <a:prstGeom prst="rect">
+              <a:avLst/>
+            </a:prstGeom>
+            <a:noFill/>
+          </p:spPr>
+          <p:txBody>
+            <a:bodyPr wrap="square" rtlCol="0">
+              <a:spAutoFit/>
+            </a:bodyPr>
+            <a:lstStyle/>
+            <a:p>
+              <a:pPr algn="ctr"/>
+              <a:r>
+                <a:rPr lang="en-US" sz="1200" i="1" dirty="0"/>
+                <a:t>g</a:t>
+              </a:r>
+            </a:p>
+            <a:p>
+              <a:pPr algn="ctr"/>
+              <a:r>
+                <a:rPr lang="en-US" sz="1200" i="1" dirty="0"/>
+                <a:t>p</a:t>
+              </a:r>
+              <a:r>
+                <a:rPr lang="en-US" sz="1200" dirty="0"/>
+                <a:t>=0.20</a:t>
+              </a:r>
+            </a:p>
+          </p:txBody>
+        </p:sp>
+      </p:grpSp>
+      <p:grpSp>
+        <p:nvGrpSpPr>
+          <p:cNvPr id="29" name="Group 28">
+            <a:extLst>
+              <a:ext uri="{FF2B5EF4-FFF2-40B4-BE49-F238E27FC236}">
+                <a16:creationId xmlns:a16="http://schemas.microsoft.com/office/drawing/2014/main" id="{156D22DD-006C-4925-BB48-65D6569CCB48}"/>
+              </a:ext>
+            </a:extLst>
+          </p:cNvPr>
+          <p:cNvGrpSpPr/>
+          <p:nvPr/>
+        </p:nvGrpSpPr>
+        <p:grpSpPr>
+          <a:xfrm>
+            <a:off x="4244637" y="5831070"/>
+            <a:ext cx="1028701" cy="461665"/>
+            <a:chOff x="1824566" y="6032498"/>
+            <a:chExt cx="1028701" cy="461665"/>
+          </a:xfrm>
+        </p:grpSpPr>
+        <p:cxnSp>
+          <p:nvCxnSpPr>
+            <p:cNvPr id="30" name="Straight Arrow Connector 29">
+              <a:extLst>
+                <a:ext uri="{FF2B5EF4-FFF2-40B4-BE49-F238E27FC236}">
+                  <a16:creationId xmlns:a16="http://schemas.microsoft.com/office/drawing/2014/main" id="{0C0C4CAF-CE28-4A7C-97CF-306938F6D372}"/>
+                </a:ext>
+              </a:extLst>
+            </p:cNvPr>
+            <p:cNvCxnSpPr/>
+            <p:nvPr/>
+          </p:nvCxnSpPr>
+          <p:spPr>
+            <a:xfrm>
+              <a:off x="1824567" y="6129867"/>
+              <a:ext cx="1028700" cy="0"/>
+            </a:xfrm>
+            <a:prstGeom prst="straightConnector1">
+              <a:avLst/>
+            </a:prstGeom>
+            <a:ln>
+              <a:tailEnd type="triangle"/>
+            </a:ln>
+          </p:spPr>
+          <p:style>
+            <a:lnRef idx="1">
+              <a:schemeClr val="accent1"/>
+            </a:lnRef>
+            <a:fillRef idx="0">
+              <a:schemeClr val="accent1"/>
+            </a:fillRef>
+            <a:effectRef idx="0">
+              <a:schemeClr val="accent1"/>
+            </a:effectRef>
+            <a:fontRef idx="minor">
+              <a:schemeClr val="tx1"/>
+            </a:fontRef>
+          </p:style>
+        </p:cxnSp>
+        <p:sp>
+          <p:nvSpPr>
+            <p:cNvPr id="31" name="TextBox 30">
+              <a:extLst>
+                <a:ext uri="{FF2B5EF4-FFF2-40B4-BE49-F238E27FC236}">
+                  <a16:creationId xmlns:a16="http://schemas.microsoft.com/office/drawing/2014/main" id="{CFA9EC13-329D-49D6-8236-63E8401D5FDD}"/>
+                </a:ext>
+              </a:extLst>
+            </p:cNvPr>
+            <p:cNvSpPr txBox="1"/>
+            <p:nvPr/>
+          </p:nvSpPr>
+          <p:spPr>
+            <a:xfrm>
+              <a:off x="1824566" y="6032498"/>
+              <a:ext cx="1024468" cy="461665"/>
+            </a:xfrm>
+            <a:prstGeom prst="rect">
+              <a:avLst/>
+            </a:prstGeom>
+            <a:noFill/>
+          </p:spPr>
+          <p:txBody>
+            <a:bodyPr wrap="square" rtlCol="0">
+              <a:spAutoFit/>
+            </a:bodyPr>
+            <a:lstStyle/>
+            <a:p>
+              <a:pPr algn="ctr"/>
+              <a:r>
+                <a:rPr lang="en-US" sz="1200" i="1" dirty="0"/>
+                <a:t>g</a:t>
+              </a:r>
+            </a:p>
+            <a:p>
+              <a:pPr algn="ctr"/>
+              <a:r>
+                <a:rPr lang="en-US" sz="1200" i="1" dirty="0"/>
+                <a:t>p</a:t>
+              </a:r>
+              <a:r>
+                <a:rPr lang="en-US" sz="1200" dirty="0"/>
+                <a:t>=0.30</a:t>
+              </a:r>
+            </a:p>
+          </p:txBody>
+        </p:sp>
+      </p:grpSp>
+      <p:grpSp>
+        <p:nvGrpSpPr>
+          <p:cNvPr id="32" name="Group 31">
+            <a:extLst>
+              <a:ext uri="{FF2B5EF4-FFF2-40B4-BE49-F238E27FC236}">
+                <a16:creationId xmlns:a16="http://schemas.microsoft.com/office/drawing/2014/main" id="{99FA8751-7578-44AA-949F-19A028BFAE75}"/>
+              </a:ext>
+            </a:extLst>
+          </p:cNvPr>
+          <p:cNvGrpSpPr/>
+          <p:nvPr/>
+        </p:nvGrpSpPr>
+        <p:grpSpPr>
+          <a:xfrm>
+            <a:off x="5425737" y="5831070"/>
+            <a:ext cx="1028701" cy="461665"/>
+            <a:chOff x="1824566" y="6032498"/>
+            <a:chExt cx="1028701" cy="461665"/>
+          </a:xfrm>
+        </p:grpSpPr>
+        <p:cxnSp>
+          <p:nvCxnSpPr>
+            <p:cNvPr id="33" name="Straight Arrow Connector 32">
+              <a:extLst>
+                <a:ext uri="{FF2B5EF4-FFF2-40B4-BE49-F238E27FC236}">
+                  <a16:creationId xmlns:a16="http://schemas.microsoft.com/office/drawing/2014/main" id="{B30A8721-2282-4726-9678-E2DDCB877C32}"/>
+                </a:ext>
+              </a:extLst>
+            </p:cNvPr>
+            <p:cNvCxnSpPr/>
+            <p:nvPr/>
+          </p:nvCxnSpPr>
+          <p:spPr>
+            <a:xfrm>
+              <a:off x="1824567" y="6129867"/>
+              <a:ext cx="1028700" cy="0"/>
+            </a:xfrm>
+            <a:prstGeom prst="straightConnector1">
+              <a:avLst/>
+            </a:prstGeom>
+            <a:ln>
+              <a:tailEnd type="triangle"/>
+            </a:ln>
+          </p:spPr>
+          <p:style>
+            <a:lnRef idx="1">
+              <a:schemeClr val="accent1"/>
+            </a:lnRef>
+            <a:fillRef idx="0">
+              <a:schemeClr val="accent1"/>
+            </a:fillRef>
+            <a:effectRef idx="0">
+              <a:schemeClr val="accent1"/>
+            </a:effectRef>
+            <a:fontRef idx="minor">
+              <a:schemeClr val="tx1"/>
+            </a:fontRef>
+          </p:style>
+        </p:cxnSp>
+        <p:sp>
+          <p:nvSpPr>
+            <p:cNvPr id="34" name="TextBox 33">
+              <a:extLst>
+                <a:ext uri="{FF2B5EF4-FFF2-40B4-BE49-F238E27FC236}">
+                  <a16:creationId xmlns:a16="http://schemas.microsoft.com/office/drawing/2014/main" id="{FCB65C75-FA3A-4321-A113-FE409B664DCA}"/>
+                </a:ext>
+              </a:extLst>
+            </p:cNvPr>
+            <p:cNvSpPr txBox="1"/>
+            <p:nvPr/>
+          </p:nvSpPr>
+          <p:spPr>
+            <a:xfrm>
+              <a:off x="1824566" y="6032498"/>
+              <a:ext cx="1024468" cy="461665"/>
+            </a:xfrm>
+            <a:prstGeom prst="rect">
+              <a:avLst/>
+            </a:prstGeom>
+            <a:noFill/>
+          </p:spPr>
+          <p:txBody>
+            <a:bodyPr wrap="square" rtlCol="0">
+              <a:spAutoFit/>
+            </a:bodyPr>
+            <a:lstStyle/>
+            <a:p>
+              <a:pPr algn="ctr"/>
+              <a:r>
+                <a:rPr lang="en-US" sz="1200" i="1" dirty="0"/>
+                <a:t>g</a:t>
+              </a:r>
+            </a:p>
+            <a:p>
+              <a:pPr algn="ctr"/>
+              <a:r>
+                <a:rPr lang="en-US" sz="1200" i="1" dirty="0"/>
+                <a:t>p</a:t>
+              </a:r>
+              <a:r>
+                <a:rPr lang="en-US" sz="1200" dirty="0"/>
+                <a:t>=0.40</a:t>
+              </a:r>
+            </a:p>
+          </p:txBody>
+        </p:sp>
+      </p:grpSp>
+      <p:grpSp>
+        <p:nvGrpSpPr>
+          <p:cNvPr id="35" name="Group 34">
+            <a:extLst>
+              <a:ext uri="{FF2B5EF4-FFF2-40B4-BE49-F238E27FC236}">
+                <a16:creationId xmlns:a16="http://schemas.microsoft.com/office/drawing/2014/main" id="{B3E2C5F7-501B-4F80-9CD1-1B6EA9F84C6D}"/>
+              </a:ext>
+            </a:extLst>
+          </p:cNvPr>
+          <p:cNvGrpSpPr/>
+          <p:nvPr/>
+        </p:nvGrpSpPr>
+        <p:grpSpPr>
+          <a:xfrm>
+            <a:off x="6657637" y="5831069"/>
+            <a:ext cx="1028701" cy="461665"/>
+            <a:chOff x="1824566" y="6032498"/>
+            <a:chExt cx="1028701" cy="461665"/>
+          </a:xfrm>
+        </p:grpSpPr>
+        <p:cxnSp>
+          <p:nvCxnSpPr>
+            <p:cNvPr id="36" name="Straight Arrow Connector 35">
+              <a:extLst>
+                <a:ext uri="{FF2B5EF4-FFF2-40B4-BE49-F238E27FC236}">
+                  <a16:creationId xmlns:a16="http://schemas.microsoft.com/office/drawing/2014/main" id="{7E0ADFE2-908D-4786-9556-5C6ACEDBC058}"/>
+                </a:ext>
+              </a:extLst>
+            </p:cNvPr>
+            <p:cNvCxnSpPr/>
+            <p:nvPr/>
+          </p:nvCxnSpPr>
+          <p:spPr>
+            <a:xfrm>
+              <a:off x="1824567" y="6129867"/>
+              <a:ext cx="1028700" cy="0"/>
+            </a:xfrm>
+            <a:prstGeom prst="straightConnector1">
+              <a:avLst/>
+            </a:prstGeom>
+            <a:ln>
+              <a:tailEnd type="triangle"/>
+            </a:ln>
+          </p:spPr>
+          <p:style>
+            <a:lnRef idx="1">
+              <a:schemeClr val="accent1"/>
+            </a:lnRef>
+            <a:fillRef idx="0">
+              <a:schemeClr val="accent1"/>
+            </a:fillRef>
+            <a:effectRef idx="0">
+              <a:schemeClr val="accent1"/>
+            </a:effectRef>
+            <a:fontRef idx="minor">
+              <a:schemeClr val="tx1"/>
+            </a:fontRef>
+          </p:style>
+        </p:cxnSp>
+        <p:sp>
+          <p:nvSpPr>
+            <p:cNvPr id="37" name="TextBox 36">
+              <a:extLst>
+                <a:ext uri="{FF2B5EF4-FFF2-40B4-BE49-F238E27FC236}">
+                  <a16:creationId xmlns:a16="http://schemas.microsoft.com/office/drawing/2014/main" id="{E5E0F6AF-4AC2-44A7-9233-367222D06F65}"/>
+                </a:ext>
+              </a:extLst>
+            </p:cNvPr>
+            <p:cNvSpPr txBox="1"/>
+            <p:nvPr/>
+          </p:nvSpPr>
+          <p:spPr>
+            <a:xfrm>
+              <a:off x="1824566" y="6032498"/>
+              <a:ext cx="1024468" cy="461665"/>
+            </a:xfrm>
+            <a:prstGeom prst="rect">
+              <a:avLst/>
+            </a:prstGeom>
+            <a:noFill/>
+          </p:spPr>
+          <p:txBody>
+            <a:bodyPr wrap="square" rtlCol="0">
+              <a:spAutoFit/>
+            </a:bodyPr>
+            <a:lstStyle/>
+            <a:p>
+              <a:pPr algn="ctr"/>
+              <a:r>
+                <a:rPr lang="en-US" sz="1200" i="1" dirty="0"/>
+                <a:t>g</a:t>
+              </a:r>
+            </a:p>
+            <a:p>
+              <a:pPr algn="ctr"/>
+              <a:r>
+                <a:rPr lang="en-US" sz="1200" i="1" dirty="0"/>
+                <a:t>p</a:t>
+              </a:r>
+              <a:r>
+                <a:rPr lang="en-US" sz="1200" dirty="0"/>
+                <a:t>=0.50</a:t>
+              </a:r>
+            </a:p>
+          </p:txBody>
+        </p:sp>
+      </p:grpSp>
+      <p:pic>
+        <p:nvPicPr>
+          <p:cNvPr id="6" name="Picture 5">
+            <a:extLst>
+              <a:ext uri="{FF2B5EF4-FFF2-40B4-BE49-F238E27FC236}">
+                <a16:creationId xmlns:a16="http://schemas.microsoft.com/office/drawing/2014/main" id="{10E33336-69B5-4A2F-B2FD-1B3B234D6197}"/>
+              </a:ext>
+            </a:extLst>
+          </p:cNvPr>
+          <p:cNvPicPr>
+            <a:picLocks noChangeAspect="1"/>
+          </p:cNvPicPr>
+          <p:nvPr/>
+        </p:nvPicPr>
+        <p:blipFill rotWithShape="1">
+          <a:blip r:embed="rId2">
+            <a:extLst>
+              <a:ext uri="{28A0092B-C50C-407E-A947-70E740481C1C}">
+                <a14:useLocalDpi xmlns:a14="http://schemas.microsoft.com/office/drawing/2010/main" val="0"/>
+              </a:ext>
+            </a:extLst>
+          </a:blip>
+          <a:srcRect l="3598" t="4924" r="1021" b="3471"/>
+          <a:stretch/>
+        </p:blipFill>
+        <p:spPr>
+          <a:xfrm>
+            <a:off x="1365336" y="1952262"/>
+            <a:ext cx="6359655" cy="3926460"/>
+          </a:xfrm>
+          <a:prstGeom prst="rect">
+            <a:avLst/>
+          </a:prstGeom>
+        </p:spPr>
+      </p:pic>
+    </p:spTree>
+    <p:extLst>
+      <p:ext uri="{BB962C8B-B14F-4D97-AF65-F5344CB8AC3E}">
+        <p14:creationId xmlns:p14="http://schemas.microsoft.com/office/powerpoint/2010/main" val="760396856"/>
+      </p:ext>
+    </p:extLst>
+  </p:cSld>
+  <p:clrMapOvr>
+    <a:masterClrMapping/>
+  </p:clrMapOvr>
+</p:sld>
+</file>
+
+<file path=ppt/slides/slide3.xml><?xml version="1.0" encoding="utf-8"?>
+<p:sld xmlns:a="http://schemas.openxmlformats.org/drawingml/2006/main" xmlns:r="http://schemas.openxmlformats.org/officeDocument/2006/relationships" xmlns:p="http://schemas.openxmlformats.org/presentationml/2006/main">
+  <p:cSld>
+    <p:spTree>
+      <p:nvGrpSpPr>
+        <p:cNvPr id="1" name=""/>
+        <p:cNvGrpSpPr/>
+        <p:nvPr/>
+      </p:nvGrpSpPr>
+      <p:grpSpPr>
+        <a:xfrm>
+          <a:off x="0" y="0"/>
+          <a:ext cx="0" cy="0"/>
+          <a:chOff x="0" y="0"/>
+          <a:chExt cx="0" cy="0"/>
+        </a:xfrm>
+      </p:grpSpPr>
+      <p:sp>
+        <p:nvSpPr>
+          <p:cNvPr id="4" name="Title 3">
+            <a:extLst>
+              <a:ext uri="{FF2B5EF4-FFF2-40B4-BE49-F238E27FC236}">
+                <a16:creationId xmlns:a16="http://schemas.microsoft.com/office/drawing/2014/main" id="{EBC4ABCE-05FA-4150-AE99-F6545909F115}"/>
+              </a:ext>
+            </a:extLst>
+          </p:cNvPr>
+          <p:cNvSpPr>
+            <a:spLocks noGrp="1"/>
+          </p:cNvSpPr>
+          <p:nvPr>
+            <p:ph type="title"/>
+          </p:nvPr>
+        </p:nvSpPr>
+        <p:spPr/>
+        <p:txBody>
+          <a:bodyPr>
+            <a:normAutofit/>
+          </a:bodyPr>
+          <a:lstStyle/>
+          <a:p>
+            <a:r>
+              <a:rPr lang="en-US" sz="1200" b="1" dirty="0"/>
+              <a:t>Figure 4. Model effects in terms of equivalent sex bias. </a:t>
+            </a:r>
+            <a:r>
+              <a:rPr lang="en-US" sz="1200" dirty="0"/>
+              <a:t>Contour plot of the </a:t>
+            </a:r>
+            <a:r>
+              <a:rPr lang="en-US" sz="1200" b="1" dirty="0"/>
+              <a:t>Odds Ratio (OR) </a:t>
+            </a:r>
+            <a:r>
+              <a:rPr lang="en-US" sz="1200" dirty="0"/>
+              <a:t>of male-favoring selection bias that yields the same equilibrium female share of selected first-time applicants as the equilibrium female share of the total applicant pool from model parameters. The vertical axis is gender differences in reapplication (</a:t>
+            </a:r>
+            <a:r>
+              <a:rPr lang="en-US" sz="1200" i="1" dirty="0"/>
+              <a:t>g</a:t>
+            </a:r>
+            <a:r>
+              <a:rPr lang="en-US" sz="1200" dirty="0"/>
+              <a:t>), and the vertical axis is the baseline reapplication rate (</a:t>
+            </a:r>
+            <a:r>
+              <a:rPr lang="en-US" sz="1200" i="1" dirty="0"/>
+              <a:t>b</a:t>
+            </a:r>
+            <a:r>
+              <a:rPr lang="en-US" sz="1200" dirty="0"/>
+              <a:t>). Female share of first-time applicants (p) for this figure is set at 0.30 or 30%, and the rejection rate experienced by all applicants (</a:t>
+            </a:r>
+            <a:r>
+              <a:rPr lang="en-US" sz="1200" i="1" dirty="0"/>
+              <a:t>r</a:t>
+            </a:r>
+            <a:r>
+              <a:rPr lang="en-US" sz="1200" dirty="0"/>
+              <a:t>) is set at 0.70 or 70%. Each contour line in the figure represents a 0.05 change in the OR from an unbiased OR of 1. </a:t>
+            </a:r>
+          </a:p>
+        </p:txBody>
+      </p:sp>
+      <p:pic>
+        <p:nvPicPr>
+          <p:cNvPr id="7" name="Picture 6">
+            <a:extLst>
+              <a:ext uri="{FF2B5EF4-FFF2-40B4-BE49-F238E27FC236}">
+                <a16:creationId xmlns:a16="http://schemas.microsoft.com/office/drawing/2014/main" id="{10BA66E4-CAB0-454C-B352-B6517C585331}"/>
+              </a:ext>
+            </a:extLst>
+          </p:cNvPr>
+          <p:cNvPicPr>
+            <a:picLocks noChangeAspect="1"/>
+          </p:cNvPicPr>
+          <p:nvPr/>
+        </p:nvPicPr>
+        <p:blipFill>
+          <a:blip r:embed="rId2">
+            <a:extLst>
+              <a:ext uri="{28A0092B-C50C-407E-A947-70E740481C1C}">
+                <a14:useLocalDpi xmlns:a14="http://schemas.microsoft.com/office/drawing/2010/main" val="0"/>
+              </a:ext>
+            </a:extLst>
+          </a:blip>
+          <a:stretch>
+            <a:fillRect/>
+          </a:stretch>
+        </p:blipFill>
+        <p:spPr>
+          <a:xfrm>
+            <a:off x="628650" y="1579167"/>
+            <a:ext cx="7886700" cy="4601539"/>
+          </a:xfrm>
+          <a:prstGeom prst="rect">
+            <a:avLst/>
+          </a:prstGeom>
+        </p:spPr>
+      </p:pic>
+    </p:spTree>
+    <p:extLst>
+      <p:ext uri="{BB962C8B-B14F-4D97-AF65-F5344CB8AC3E}">
+        <p14:creationId xmlns:p14="http://schemas.microsoft.com/office/powerpoint/2010/main" val="2110773135"/>
+      </p:ext>
+    </p:extLst>
+  </p:cSld>
+  <p:clrMapOvr>
+    <a:masterClrMapping/>
+  </p:clrMapOvr>
+</p:sld>
+</file>
+
+<file path=ppt/slides/slide4.xml><?xml version="1.0" encoding="utf-8"?>
+<p:sld xmlns:a="http://schemas.openxmlformats.org/drawingml/2006/main" xmlns:r="http://schemas.openxmlformats.org/officeDocument/2006/relationships" xmlns:p="http://schemas.openxmlformats.org/presentationml/2006/main">
+  <p:cSld>
+    <p:spTree>
+      <p:nvGrpSpPr>
+        <p:cNvPr id="1" name=""/>
+        <p:cNvGrpSpPr/>
+        <p:nvPr/>
+      </p:nvGrpSpPr>
+      <p:grpSpPr>
+        <a:xfrm>
+          <a:off x="0" y="0"/>
+          <a:ext cx="0" cy="0"/>
+          <a:chOff x="0" y="0"/>
+          <a:chExt cx="0" cy="0"/>
+        </a:xfrm>
+      </p:grpSpPr>
+      <p:sp>
+        <p:nvSpPr>
+          <p:cNvPr id="4" name="Title 3">
+            <a:extLst>
+              <a:ext uri="{FF2B5EF4-FFF2-40B4-BE49-F238E27FC236}">
+                <a16:creationId xmlns:a16="http://schemas.microsoft.com/office/drawing/2014/main" id="{EBC4ABCE-05FA-4150-AE99-F6545909F115}"/>
+              </a:ext>
+            </a:extLst>
+          </p:cNvPr>
+          <p:cNvSpPr>
+            <a:spLocks noGrp="1"/>
+          </p:cNvSpPr>
+          <p:nvPr>
+            <p:ph type="title"/>
+          </p:nvPr>
+        </p:nvSpPr>
+        <p:spPr/>
+        <p:txBody>
+          <a:bodyPr>
+            <a:normAutofit/>
+          </a:bodyPr>
+          <a:lstStyle/>
+          <a:p>
+            <a:r>
+              <a:rPr lang="en-US" sz="1200" b="1" dirty="0"/>
+              <a:t>Figure 5. </a:t>
+            </a:r>
+            <a:r>
+              <a:rPr lang="en-US" sz="1200" dirty="0"/>
+              <a:t>Model effects in terms of equivalent sex bias. Panels plot the Odds Ratio (OR) of male-favoring selection bias that yields the same equilibrium female share of selected first-time applicants as the equilibrium female share of the total applicant pool from gender differences in reapplication (</a:t>
+            </a:r>
+            <a:r>
+              <a:rPr lang="en-US" sz="1200" i="1" dirty="0"/>
+              <a:t>g</a:t>
+            </a:r>
+            <a:r>
+              <a:rPr lang="en-US" sz="1200" dirty="0"/>
+              <a:t>) and the three other model parameters: baseline (women’s) reapplication rate (</a:t>
+            </a:r>
+            <a:r>
+              <a:rPr lang="en-US" sz="1200" i="1" dirty="0"/>
+              <a:t>b</a:t>
+            </a:r>
+            <a:r>
+              <a:rPr lang="en-US" sz="1200" dirty="0"/>
+              <a:t>), female share of first-time applicants (</a:t>
+            </a:r>
+            <a:r>
+              <a:rPr lang="en-US" sz="1200" i="1" dirty="0"/>
+              <a:t>p</a:t>
+            </a:r>
+            <a:r>
+              <a:rPr lang="en-US" sz="1200" dirty="0"/>
+              <a:t>), and rejection rate experienced by all applicants (</a:t>
+            </a:r>
+            <a:r>
+              <a:rPr lang="en-US" sz="1200" i="1" dirty="0"/>
+              <a:t>r</a:t>
+            </a:r>
+            <a:r>
+              <a:rPr lang="en-US" sz="1200" dirty="0"/>
+              <a:t>). Each row of panels has the same rejection rate (</a:t>
+            </a:r>
+            <a:r>
+              <a:rPr lang="en-US" sz="1200" i="1" dirty="0"/>
+              <a:t>r</a:t>
+            </a:r>
+            <a:r>
+              <a:rPr lang="en-US" sz="1200" dirty="0"/>
+              <a:t>). Each column of panels has the same female share of first-time applicants (</a:t>
+            </a:r>
+            <a:r>
+              <a:rPr lang="en-US" sz="1200" i="1" dirty="0"/>
+              <a:t>p</a:t>
+            </a:r>
+            <a:r>
+              <a:rPr lang="en-US" sz="1200" dirty="0"/>
+              <a:t>). Each contour line in the panels represents a 0.05 change in the OR from an unbiased OR of 1. </a:t>
+            </a:r>
+          </a:p>
+        </p:txBody>
+      </p:sp>
+      <p:grpSp>
+        <p:nvGrpSpPr>
+          <p:cNvPr id="10" name="Group 9">
+            <a:extLst>
+              <a:ext uri="{FF2B5EF4-FFF2-40B4-BE49-F238E27FC236}">
+                <a16:creationId xmlns:a16="http://schemas.microsoft.com/office/drawing/2014/main" id="{D8C28C92-9452-451E-8558-2920121C5855}"/>
+              </a:ext>
+            </a:extLst>
+          </p:cNvPr>
+          <p:cNvGrpSpPr/>
+          <p:nvPr/>
+        </p:nvGrpSpPr>
+        <p:grpSpPr>
+          <a:xfrm>
+            <a:off x="1609360" y="5723743"/>
+            <a:ext cx="1028701" cy="461665"/>
+            <a:chOff x="1824566" y="6032498"/>
+            <a:chExt cx="1028701" cy="461665"/>
+          </a:xfrm>
+        </p:grpSpPr>
+        <p:cxnSp>
+          <p:nvCxnSpPr>
+            <p:cNvPr id="8" name="Straight Arrow Connector 7">
+              <a:extLst>
+                <a:ext uri="{FF2B5EF4-FFF2-40B4-BE49-F238E27FC236}">
+                  <a16:creationId xmlns:a16="http://schemas.microsoft.com/office/drawing/2014/main" id="{9084F9C8-1732-4B21-A64C-BF95D5983E5A}"/>
+                </a:ext>
+              </a:extLst>
+            </p:cNvPr>
+            <p:cNvCxnSpPr/>
+            <p:nvPr/>
+          </p:nvCxnSpPr>
+          <p:spPr>
+            <a:xfrm>
+              <a:off x="1824567" y="6129867"/>
+              <a:ext cx="1028700" cy="0"/>
+            </a:xfrm>
+            <a:prstGeom prst="straightConnector1">
+              <a:avLst/>
+            </a:prstGeom>
+            <a:ln>
+              <a:tailEnd type="triangle"/>
+            </a:ln>
+          </p:spPr>
+          <p:style>
+            <a:lnRef idx="1">
+              <a:schemeClr val="accent1"/>
+            </a:lnRef>
+            <a:fillRef idx="0">
+              <a:schemeClr val="accent1"/>
+            </a:fillRef>
+            <a:effectRef idx="0">
+              <a:schemeClr val="accent1"/>
+            </a:effectRef>
+            <a:fontRef idx="minor">
+              <a:schemeClr val="tx1"/>
+            </a:fontRef>
+          </p:style>
+        </p:cxnSp>
+        <p:sp>
+          <p:nvSpPr>
+            <p:cNvPr id="9" name="TextBox 8">
+              <a:extLst>
+                <a:ext uri="{FF2B5EF4-FFF2-40B4-BE49-F238E27FC236}">
+                  <a16:creationId xmlns:a16="http://schemas.microsoft.com/office/drawing/2014/main" id="{9DB8F885-F0E2-4553-BC61-6C87D3281720}"/>
+                </a:ext>
+              </a:extLst>
+            </p:cNvPr>
+            <p:cNvSpPr txBox="1"/>
+            <p:nvPr/>
+          </p:nvSpPr>
+          <p:spPr>
+            <a:xfrm>
+              <a:off x="1824566" y="6032498"/>
+              <a:ext cx="1024468" cy="461665"/>
+            </a:xfrm>
+            <a:prstGeom prst="rect">
+              <a:avLst/>
+            </a:prstGeom>
+            <a:noFill/>
+          </p:spPr>
+          <p:txBody>
+            <a:bodyPr wrap="square" rtlCol="0">
+              <a:spAutoFit/>
+            </a:bodyPr>
+            <a:lstStyle/>
+            <a:p>
+              <a:pPr algn="ctr"/>
+              <a:r>
+                <a:rPr lang="en-US" sz="1200" i="1" dirty="0"/>
+                <a:t>g</a:t>
+              </a:r>
+            </a:p>
+            <a:p>
+              <a:pPr algn="ctr"/>
+              <a:r>
+                <a:rPr lang="en-US" sz="1200" i="1" dirty="0"/>
+                <a:t>p</a:t>
+              </a:r>
+              <a:r>
+                <a:rPr lang="en-US" sz="1200" dirty="0"/>
+                <a:t>=0.10</a:t>
+              </a:r>
+            </a:p>
+          </p:txBody>
+        </p:sp>
+      </p:grpSp>
+      <p:grpSp>
+        <p:nvGrpSpPr>
+          <p:cNvPr id="23" name="Group 22">
+            <a:extLst>
+              <a:ext uri="{FF2B5EF4-FFF2-40B4-BE49-F238E27FC236}">
+                <a16:creationId xmlns:a16="http://schemas.microsoft.com/office/drawing/2014/main" id="{6AFB9536-D78B-4FBC-8ABD-F98923F0A21E}"/>
+              </a:ext>
+            </a:extLst>
+          </p:cNvPr>
+          <p:cNvGrpSpPr/>
+          <p:nvPr/>
+        </p:nvGrpSpPr>
+        <p:grpSpPr>
+          <a:xfrm>
+            <a:off x="3023860" y="5723742"/>
+            <a:ext cx="1028701" cy="461665"/>
+            <a:chOff x="1824566" y="6032498"/>
+            <a:chExt cx="1028701" cy="461665"/>
+          </a:xfrm>
+        </p:grpSpPr>
+        <p:cxnSp>
+          <p:nvCxnSpPr>
+            <p:cNvPr id="24" name="Straight Arrow Connector 23">
+              <a:extLst>
+                <a:ext uri="{FF2B5EF4-FFF2-40B4-BE49-F238E27FC236}">
+                  <a16:creationId xmlns:a16="http://schemas.microsoft.com/office/drawing/2014/main" id="{E4248553-1EAC-4972-9BDF-D269EAC84997}"/>
+                </a:ext>
+              </a:extLst>
+            </p:cNvPr>
+            <p:cNvCxnSpPr/>
+            <p:nvPr/>
+          </p:nvCxnSpPr>
+          <p:spPr>
+            <a:xfrm>
+              <a:off x="1824567" y="6129867"/>
+              <a:ext cx="1028700" cy="0"/>
+            </a:xfrm>
+            <a:prstGeom prst="straightConnector1">
+              <a:avLst/>
+            </a:prstGeom>
+            <a:ln>
+              <a:tailEnd type="triangle"/>
+            </a:ln>
+          </p:spPr>
+          <p:style>
+            <a:lnRef idx="1">
+              <a:schemeClr val="accent1"/>
+            </a:lnRef>
+            <a:fillRef idx="0">
+              <a:schemeClr val="accent1"/>
+            </a:fillRef>
+            <a:effectRef idx="0">
+              <a:schemeClr val="accent1"/>
+            </a:effectRef>
+            <a:fontRef idx="minor">
+              <a:schemeClr val="tx1"/>
+            </a:fontRef>
+          </p:style>
+        </p:cxnSp>
+        <p:sp>
+          <p:nvSpPr>
+            <p:cNvPr id="25" name="TextBox 24">
+              <a:extLst>
+                <a:ext uri="{FF2B5EF4-FFF2-40B4-BE49-F238E27FC236}">
+                  <a16:creationId xmlns:a16="http://schemas.microsoft.com/office/drawing/2014/main" id="{D74BA518-4165-461F-940C-3182CD547302}"/>
+                </a:ext>
+              </a:extLst>
+            </p:cNvPr>
+            <p:cNvSpPr txBox="1"/>
+            <p:nvPr/>
+          </p:nvSpPr>
+          <p:spPr>
+            <a:xfrm>
+              <a:off x="1824566" y="6032498"/>
+              <a:ext cx="1024468" cy="461665"/>
+            </a:xfrm>
+            <a:prstGeom prst="rect">
+              <a:avLst/>
+            </a:prstGeom>
+            <a:noFill/>
+          </p:spPr>
+          <p:txBody>
+            <a:bodyPr wrap="square" rtlCol="0">
+              <a:spAutoFit/>
+            </a:bodyPr>
+            <a:lstStyle/>
+            <a:p>
+              <a:pPr algn="ctr"/>
+              <a:r>
+                <a:rPr lang="en-US" sz="1200" i="1" dirty="0"/>
+                <a:t>g</a:t>
+              </a:r>
+            </a:p>
+            <a:p>
+              <a:pPr algn="ctr"/>
+              <a:r>
+                <a:rPr lang="en-US" sz="1200" i="1" dirty="0"/>
+                <a:t>p</a:t>
+              </a:r>
+              <a:r>
+                <a:rPr lang="en-US" sz="1200" dirty="0"/>
+                <a:t>=0.20</a:t>
+              </a:r>
+            </a:p>
+          </p:txBody>
+        </p:sp>
+      </p:grpSp>
+      <p:grpSp>
+        <p:nvGrpSpPr>
+          <p:cNvPr id="29" name="Group 28">
+            <a:extLst>
+              <a:ext uri="{FF2B5EF4-FFF2-40B4-BE49-F238E27FC236}">
+                <a16:creationId xmlns:a16="http://schemas.microsoft.com/office/drawing/2014/main" id="{C46B9191-26A0-4FD4-8738-9A12E94157A1}"/>
+              </a:ext>
+            </a:extLst>
+          </p:cNvPr>
+          <p:cNvGrpSpPr/>
+          <p:nvPr/>
+        </p:nvGrpSpPr>
+        <p:grpSpPr>
+          <a:xfrm>
+            <a:off x="5607529" y="5723742"/>
+            <a:ext cx="1028701" cy="461665"/>
+            <a:chOff x="1824566" y="6032498"/>
+            <a:chExt cx="1028701" cy="461665"/>
+          </a:xfrm>
+        </p:grpSpPr>
+        <p:cxnSp>
+          <p:nvCxnSpPr>
+            <p:cNvPr id="30" name="Straight Arrow Connector 29">
+              <a:extLst>
+                <a:ext uri="{FF2B5EF4-FFF2-40B4-BE49-F238E27FC236}">
+                  <a16:creationId xmlns:a16="http://schemas.microsoft.com/office/drawing/2014/main" id="{3C29DD71-F722-4B65-BC5D-60949D7B5A90}"/>
+                </a:ext>
+              </a:extLst>
+            </p:cNvPr>
+            <p:cNvCxnSpPr/>
+            <p:nvPr/>
+          </p:nvCxnSpPr>
+          <p:spPr>
+            <a:xfrm>
+              <a:off x="1824567" y="6129867"/>
+              <a:ext cx="1028700" cy="0"/>
+            </a:xfrm>
+            <a:prstGeom prst="straightConnector1">
+              <a:avLst/>
+            </a:prstGeom>
+            <a:ln>
+              <a:tailEnd type="triangle"/>
+            </a:ln>
+          </p:spPr>
+          <p:style>
+            <a:lnRef idx="1">
+              <a:schemeClr val="accent1"/>
+            </a:lnRef>
+            <a:fillRef idx="0">
+              <a:schemeClr val="accent1"/>
+            </a:fillRef>
+            <a:effectRef idx="0">
+              <a:schemeClr val="accent1"/>
+            </a:effectRef>
+            <a:fontRef idx="minor">
+              <a:schemeClr val="tx1"/>
+            </a:fontRef>
+          </p:style>
+        </p:cxnSp>
+        <p:sp>
+          <p:nvSpPr>
+            <p:cNvPr id="31" name="TextBox 30">
+              <a:extLst>
+                <a:ext uri="{FF2B5EF4-FFF2-40B4-BE49-F238E27FC236}">
+                  <a16:creationId xmlns:a16="http://schemas.microsoft.com/office/drawing/2014/main" id="{765C23D0-505E-4973-884A-B772740A5716}"/>
+                </a:ext>
+              </a:extLst>
+            </p:cNvPr>
+            <p:cNvSpPr txBox="1"/>
+            <p:nvPr/>
+          </p:nvSpPr>
+          <p:spPr>
+            <a:xfrm>
+              <a:off x="1824566" y="6032498"/>
+              <a:ext cx="1024468" cy="461665"/>
+            </a:xfrm>
+            <a:prstGeom prst="rect">
+              <a:avLst/>
+            </a:prstGeom>
+            <a:noFill/>
+          </p:spPr>
+          <p:txBody>
+            <a:bodyPr wrap="square" rtlCol="0">
+              <a:spAutoFit/>
+            </a:bodyPr>
+            <a:lstStyle/>
+            <a:p>
+              <a:pPr algn="ctr"/>
+              <a:r>
+                <a:rPr lang="en-US" sz="1200" i="1" dirty="0"/>
+                <a:t>g</a:t>
+              </a:r>
+            </a:p>
+            <a:p>
+              <a:pPr algn="ctr"/>
+              <a:r>
+                <a:rPr lang="en-US" sz="1200" i="1" dirty="0"/>
+                <a:t>p</a:t>
+              </a:r>
+              <a:r>
+                <a:rPr lang="en-US" sz="1200" dirty="0"/>
+                <a:t>=0.40</a:t>
+              </a:r>
+            </a:p>
+          </p:txBody>
+        </p:sp>
+      </p:grpSp>
+      <p:grpSp>
+        <p:nvGrpSpPr>
+          <p:cNvPr id="32" name="Group 31">
+            <a:extLst>
+              <a:ext uri="{FF2B5EF4-FFF2-40B4-BE49-F238E27FC236}">
+                <a16:creationId xmlns:a16="http://schemas.microsoft.com/office/drawing/2014/main" id="{2D724FCC-F328-46BE-853A-8B1F7DBF66C8}"/>
+              </a:ext>
+            </a:extLst>
+          </p:cNvPr>
+          <p:cNvGrpSpPr/>
+          <p:nvPr/>
+        </p:nvGrpSpPr>
+        <p:grpSpPr>
+          <a:xfrm>
+            <a:off x="6955180" y="5723741"/>
+            <a:ext cx="1028701" cy="461665"/>
+            <a:chOff x="1824566" y="6032498"/>
+            <a:chExt cx="1028701" cy="461665"/>
+          </a:xfrm>
+        </p:grpSpPr>
+        <p:cxnSp>
+          <p:nvCxnSpPr>
+            <p:cNvPr id="33" name="Straight Arrow Connector 32">
+              <a:extLst>
+                <a:ext uri="{FF2B5EF4-FFF2-40B4-BE49-F238E27FC236}">
+                  <a16:creationId xmlns:a16="http://schemas.microsoft.com/office/drawing/2014/main" id="{DE0A51E9-F0D2-4AE2-B50A-B17E9C9D5C9E}"/>
+                </a:ext>
+              </a:extLst>
+            </p:cNvPr>
+            <p:cNvCxnSpPr/>
+            <p:nvPr/>
+          </p:nvCxnSpPr>
+          <p:spPr>
+            <a:xfrm>
+              <a:off x="1824567" y="6129867"/>
+              <a:ext cx="1028700" cy="0"/>
+            </a:xfrm>
+            <a:prstGeom prst="straightConnector1">
+              <a:avLst/>
+            </a:prstGeom>
+            <a:ln>
+              <a:tailEnd type="triangle"/>
+            </a:ln>
+          </p:spPr>
+          <p:style>
+            <a:lnRef idx="1">
+              <a:schemeClr val="accent1"/>
+            </a:lnRef>
+            <a:fillRef idx="0">
+              <a:schemeClr val="accent1"/>
+            </a:fillRef>
+            <a:effectRef idx="0">
+              <a:schemeClr val="accent1"/>
+            </a:effectRef>
+            <a:fontRef idx="minor">
+              <a:schemeClr val="tx1"/>
+            </a:fontRef>
+          </p:style>
+        </p:cxnSp>
+        <p:sp>
+          <p:nvSpPr>
+            <p:cNvPr id="34" name="TextBox 33">
+              <a:extLst>
+                <a:ext uri="{FF2B5EF4-FFF2-40B4-BE49-F238E27FC236}">
+                  <a16:creationId xmlns:a16="http://schemas.microsoft.com/office/drawing/2014/main" id="{1C4E772A-33C0-4BC9-B1CE-EA1DBA65476D}"/>
+                </a:ext>
+              </a:extLst>
+            </p:cNvPr>
+            <p:cNvSpPr txBox="1"/>
+            <p:nvPr/>
+          </p:nvSpPr>
+          <p:spPr>
+            <a:xfrm>
+              <a:off x="1824566" y="6032498"/>
+              <a:ext cx="1024468" cy="461665"/>
+            </a:xfrm>
+            <a:prstGeom prst="rect">
+              <a:avLst/>
+            </a:prstGeom>
+            <a:noFill/>
+          </p:spPr>
+          <p:txBody>
+            <a:bodyPr wrap="square" rtlCol="0">
+              <a:spAutoFit/>
+            </a:bodyPr>
+            <a:lstStyle/>
+            <a:p>
+              <a:pPr algn="ctr"/>
+              <a:r>
+                <a:rPr lang="en-US" sz="1200" i="1" dirty="0"/>
+                <a:t>g</a:t>
+              </a:r>
+            </a:p>
+            <a:p>
+              <a:pPr algn="ctr"/>
+              <a:r>
+                <a:rPr lang="en-US" sz="1200" i="1" dirty="0"/>
+                <a:t>p</a:t>
+              </a:r>
+              <a:r>
+                <a:rPr lang="en-US" sz="1200" dirty="0"/>
+                <a:t>=0.50</a:t>
+              </a:r>
+            </a:p>
+          </p:txBody>
+        </p:sp>
+      </p:grpSp>
+      <p:grpSp>
+        <p:nvGrpSpPr>
+          <p:cNvPr id="35" name="Group 34">
+            <a:extLst>
+              <a:ext uri="{FF2B5EF4-FFF2-40B4-BE49-F238E27FC236}">
+                <a16:creationId xmlns:a16="http://schemas.microsoft.com/office/drawing/2014/main" id="{9B4497C7-68A9-4E10-827D-9E63FCDE88AF}"/>
+              </a:ext>
+            </a:extLst>
+          </p:cNvPr>
+          <p:cNvGrpSpPr/>
+          <p:nvPr/>
+        </p:nvGrpSpPr>
+        <p:grpSpPr>
+          <a:xfrm>
+            <a:off x="807756" y="4071597"/>
+            <a:ext cx="553998" cy="585093"/>
+            <a:chOff x="1879602" y="5615517"/>
+            <a:chExt cx="553998" cy="1028700"/>
+          </a:xfrm>
+        </p:grpSpPr>
+        <p:cxnSp>
+          <p:nvCxnSpPr>
+            <p:cNvPr id="36" name="Straight Arrow Connector 35">
+              <a:extLst>
+                <a:ext uri="{FF2B5EF4-FFF2-40B4-BE49-F238E27FC236}">
+                  <a16:creationId xmlns:a16="http://schemas.microsoft.com/office/drawing/2014/main" id="{ACBB6CB2-64D5-4156-870A-2BE0B70E3FE5}"/>
+                </a:ext>
+              </a:extLst>
+            </p:cNvPr>
+            <p:cNvCxnSpPr>
+              <a:cxnSpLocks/>
+            </p:cNvCxnSpPr>
+            <p:nvPr/>
+          </p:nvCxnSpPr>
+          <p:spPr>
+            <a:xfrm rot="16200000">
+              <a:off x="1824567" y="6129867"/>
+              <a:ext cx="1028700" cy="0"/>
+            </a:xfrm>
+            <a:prstGeom prst="straightConnector1">
+              <a:avLst/>
+            </a:prstGeom>
+            <a:ln>
+              <a:tailEnd type="triangle"/>
+            </a:ln>
+          </p:spPr>
+          <p:style>
+            <a:lnRef idx="1">
+              <a:schemeClr val="accent1"/>
+            </a:lnRef>
+            <a:fillRef idx="0">
+              <a:schemeClr val="accent1"/>
+            </a:fillRef>
+            <a:effectRef idx="0">
+              <a:schemeClr val="accent1"/>
+            </a:effectRef>
+            <a:fontRef idx="minor">
+              <a:schemeClr val="tx1"/>
+            </a:fontRef>
+          </p:style>
+        </p:cxnSp>
+        <p:sp>
+          <p:nvSpPr>
+            <p:cNvPr id="37" name="TextBox 36">
+              <a:extLst>
+                <a:ext uri="{FF2B5EF4-FFF2-40B4-BE49-F238E27FC236}">
+                  <a16:creationId xmlns:a16="http://schemas.microsoft.com/office/drawing/2014/main" id="{5E936E9E-54AB-4417-B29B-8532457C7134}"/>
+                </a:ext>
+              </a:extLst>
+            </p:cNvPr>
+            <p:cNvSpPr txBox="1"/>
+            <p:nvPr/>
+          </p:nvSpPr>
+          <p:spPr>
+            <a:xfrm>
+              <a:off x="1879602" y="5615517"/>
+              <a:ext cx="553998" cy="1028698"/>
+            </a:xfrm>
+            <a:prstGeom prst="rect">
+              <a:avLst/>
+            </a:prstGeom>
+            <a:noFill/>
+          </p:spPr>
+          <p:txBody>
+            <a:bodyPr vert="vert270" wrap="square" rtlCol="0">
+              <a:spAutoFit/>
+            </a:bodyPr>
+            <a:lstStyle/>
+            <a:p>
+              <a:pPr algn="ctr"/>
+              <a:r>
+                <a:rPr lang="en-US" sz="1200" i="1" dirty="0"/>
+                <a:t>r</a:t>
+              </a:r>
+              <a:r>
+                <a:rPr lang="en-US" sz="1200" dirty="0"/>
+                <a:t>=0.70</a:t>
+              </a:r>
+              <a:endParaRPr lang="en-US" sz="1200" i="1" dirty="0"/>
+            </a:p>
+            <a:p>
+              <a:pPr algn="ctr"/>
+              <a:r>
+                <a:rPr lang="en-US" sz="1200" i="1" dirty="0"/>
+                <a:t>b</a:t>
+              </a:r>
+            </a:p>
+          </p:txBody>
+        </p:sp>
+      </p:grpSp>
+      <p:grpSp>
+        <p:nvGrpSpPr>
+          <p:cNvPr id="38" name="Group 37">
+            <a:extLst>
+              <a:ext uri="{FF2B5EF4-FFF2-40B4-BE49-F238E27FC236}">
+                <a16:creationId xmlns:a16="http://schemas.microsoft.com/office/drawing/2014/main" id="{02542708-3527-4892-9EB9-3D1DC10CF8F6}"/>
+              </a:ext>
+            </a:extLst>
+          </p:cNvPr>
+          <p:cNvGrpSpPr/>
+          <p:nvPr/>
+        </p:nvGrpSpPr>
+        <p:grpSpPr>
+          <a:xfrm>
+            <a:off x="807756" y="4896883"/>
+            <a:ext cx="553998" cy="651176"/>
+            <a:chOff x="1879602" y="5615517"/>
+            <a:chExt cx="553998" cy="1028700"/>
+          </a:xfrm>
+        </p:grpSpPr>
+        <p:cxnSp>
+          <p:nvCxnSpPr>
+            <p:cNvPr id="39" name="Straight Arrow Connector 38">
+              <a:extLst>
+                <a:ext uri="{FF2B5EF4-FFF2-40B4-BE49-F238E27FC236}">
+                  <a16:creationId xmlns:a16="http://schemas.microsoft.com/office/drawing/2014/main" id="{C8775638-CF3B-45EA-A9F9-4FA263E4CA9C}"/>
+                </a:ext>
+              </a:extLst>
+            </p:cNvPr>
+            <p:cNvCxnSpPr>
+              <a:cxnSpLocks/>
+            </p:cNvCxnSpPr>
+            <p:nvPr/>
+          </p:nvCxnSpPr>
+          <p:spPr>
+            <a:xfrm rot="16200000">
+              <a:off x="1824567" y="6129867"/>
+              <a:ext cx="1028700" cy="0"/>
+            </a:xfrm>
+            <a:prstGeom prst="straightConnector1">
+              <a:avLst/>
+            </a:prstGeom>
+            <a:ln>
+              <a:tailEnd type="triangle"/>
+            </a:ln>
+          </p:spPr>
+          <p:style>
+            <a:lnRef idx="1">
+              <a:schemeClr val="accent1"/>
+            </a:lnRef>
+            <a:fillRef idx="0">
+              <a:schemeClr val="accent1"/>
+            </a:fillRef>
+            <a:effectRef idx="0">
+              <a:schemeClr val="accent1"/>
+            </a:effectRef>
+            <a:fontRef idx="minor">
+              <a:schemeClr val="tx1"/>
+            </a:fontRef>
+          </p:style>
+        </p:cxnSp>
+        <p:sp>
+          <p:nvSpPr>
+            <p:cNvPr id="40" name="TextBox 39">
+              <a:extLst>
+                <a:ext uri="{FF2B5EF4-FFF2-40B4-BE49-F238E27FC236}">
+                  <a16:creationId xmlns:a16="http://schemas.microsoft.com/office/drawing/2014/main" id="{EAF5493E-9D4C-4075-90C3-0F33D1A25765}"/>
+                </a:ext>
+              </a:extLst>
+            </p:cNvPr>
+            <p:cNvSpPr txBox="1"/>
+            <p:nvPr/>
+          </p:nvSpPr>
+          <p:spPr>
+            <a:xfrm>
+              <a:off x="1879602" y="5615517"/>
+              <a:ext cx="553998" cy="1028698"/>
+            </a:xfrm>
+            <a:prstGeom prst="rect">
+              <a:avLst/>
+            </a:prstGeom>
+            <a:noFill/>
+          </p:spPr>
+          <p:txBody>
+            <a:bodyPr vert="vert270" wrap="square" rtlCol="0">
+              <a:spAutoFit/>
+            </a:bodyPr>
+            <a:lstStyle/>
+            <a:p>
+              <a:pPr algn="ctr"/>
+              <a:r>
+                <a:rPr lang="en-US" sz="1200" i="1" dirty="0"/>
+                <a:t>r</a:t>
+              </a:r>
+              <a:r>
+                <a:rPr lang="en-US" sz="1200" dirty="0"/>
+                <a:t>=0.90</a:t>
+              </a:r>
+              <a:endParaRPr lang="en-US" sz="1200" i="1" dirty="0"/>
+            </a:p>
+            <a:p>
+              <a:pPr algn="ctr"/>
+              <a:r>
+                <a:rPr lang="en-US" sz="1200" i="1" dirty="0"/>
+                <a:t>b</a:t>
+              </a:r>
+            </a:p>
+          </p:txBody>
+        </p:sp>
+      </p:grpSp>
+      <p:grpSp>
+        <p:nvGrpSpPr>
+          <p:cNvPr id="41" name="Group 40">
+            <a:extLst>
+              <a:ext uri="{FF2B5EF4-FFF2-40B4-BE49-F238E27FC236}">
+                <a16:creationId xmlns:a16="http://schemas.microsoft.com/office/drawing/2014/main" id="{4265FAD0-2EA2-4245-BDDD-94FFA1396B7D}"/>
+              </a:ext>
+            </a:extLst>
+          </p:cNvPr>
+          <p:cNvGrpSpPr/>
+          <p:nvPr/>
+        </p:nvGrpSpPr>
+        <p:grpSpPr>
+          <a:xfrm>
+            <a:off x="807756" y="3271362"/>
+            <a:ext cx="553998" cy="585093"/>
+            <a:chOff x="1879602" y="5615517"/>
+            <a:chExt cx="553998" cy="1028700"/>
+          </a:xfrm>
+        </p:grpSpPr>
+        <p:cxnSp>
+          <p:nvCxnSpPr>
+            <p:cNvPr id="42" name="Straight Arrow Connector 41">
+              <a:extLst>
+                <a:ext uri="{FF2B5EF4-FFF2-40B4-BE49-F238E27FC236}">
+                  <a16:creationId xmlns:a16="http://schemas.microsoft.com/office/drawing/2014/main" id="{52874A2A-A225-4636-9364-266690B26CCE}"/>
+                </a:ext>
+              </a:extLst>
+            </p:cNvPr>
+            <p:cNvCxnSpPr>
+              <a:cxnSpLocks/>
+            </p:cNvCxnSpPr>
+            <p:nvPr/>
+          </p:nvCxnSpPr>
+          <p:spPr>
+            <a:xfrm rot="16200000">
+              <a:off x="1824567" y="6129867"/>
+              <a:ext cx="1028700" cy="0"/>
+            </a:xfrm>
+            <a:prstGeom prst="straightConnector1">
+              <a:avLst/>
+            </a:prstGeom>
+            <a:ln>
+              <a:tailEnd type="triangle"/>
+            </a:ln>
+          </p:spPr>
+          <p:style>
+            <a:lnRef idx="1">
+              <a:schemeClr val="accent1"/>
+            </a:lnRef>
+            <a:fillRef idx="0">
+              <a:schemeClr val="accent1"/>
+            </a:fillRef>
+            <a:effectRef idx="0">
+              <a:schemeClr val="accent1"/>
+            </a:effectRef>
+            <a:fontRef idx="minor">
+              <a:schemeClr val="tx1"/>
+            </a:fontRef>
+          </p:style>
+        </p:cxnSp>
+        <p:sp>
+          <p:nvSpPr>
+            <p:cNvPr id="43" name="TextBox 42">
+              <a:extLst>
+                <a:ext uri="{FF2B5EF4-FFF2-40B4-BE49-F238E27FC236}">
+                  <a16:creationId xmlns:a16="http://schemas.microsoft.com/office/drawing/2014/main" id="{7C227746-E2F1-428C-9DDD-55E995792426}"/>
+                </a:ext>
+              </a:extLst>
+            </p:cNvPr>
+            <p:cNvSpPr txBox="1"/>
+            <p:nvPr/>
+          </p:nvSpPr>
+          <p:spPr>
+            <a:xfrm>
+              <a:off x="1879602" y="5615517"/>
+              <a:ext cx="553998" cy="1028698"/>
+            </a:xfrm>
+            <a:prstGeom prst="rect">
+              <a:avLst/>
+            </a:prstGeom>
+            <a:noFill/>
+          </p:spPr>
+          <p:txBody>
+            <a:bodyPr vert="vert270" wrap="square" rtlCol="0">
+              <a:spAutoFit/>
+            </a:bodyPr>
+            <a:lstStyle/>
+            <a:p>
+              <a:pPr algn="ctr"/>
+              <a:r>
+                <a:rPr lang="en-US" sz="1200" i="1" dirty="0"/>
+                <a:t>r</a:t>
+              </a:r>
+              <a:r>
+                <a:rPr lang="en-US" sz="1200" dirty="0"/>
+                <a:t>=0.50</a:t>
+              </a:r>
+              <a:endParaRPr lang="en-US" sz="1200" i="1" dirty="0"/>
+            </a:p>
+            <a:p>
+              <a:pPr algn="ctr"/>
+              <a:r>
+                <a:rPr lang="en-US" sz="1200" i="1" dirty="0"/>
+                <a:t>b</a:t>
+              </a:r>
+            </a:p>
+          </p:txBody>
+        </p:sp>
+      </p:grpSp>
+      <p:grpSp>
+        <p:nvGrpSpPr>
+          <p:cNvPr id="44" name="Group 43">
+            <a:extLst>
+              <a:ext uri="{FF2B5EF4-FFF2-40B4-BE49-F238E27FC236}">
+                <a16:creationId xmlns:a16="http://schemas.microsoft.com/office/drawing/2014/main" id="{B25B2F95-B085-476D-BD8A-E7E7AA0F9901}"/>
+              </a:ext>
+            </a:extLst>
+          </p:cNvPr>
+          <p:cNvGrpSpPr/>
+          <p:nvPr/>
+        </p:nvGrpSpPr>
+        <p:grpSpPr>
+          <a:xfrm>
+            <a:off x="807756" y="2485017"/>
+            <a:ext cx="553998" cy="585093"/>
+            <a:chOff x="1879602" y="5615517"/>
+            <a:chExt cx="553998" cy="1028700"/>
+          </a:xfrm>
+        </p:grpSpPr>
+        <p:cxnSp>
+          <p:nvCxnSpPr>
+            <p:cNvPr id="45" name="Straight Arrow Connector 44">
+              <a:extLst>
+                <a:ext uri="{FF2B5EF4-FFF2-40B4-BE49-F238E27FC236}">
+                  <a16:creationId xmlns:a16="http://schemas.microsoft.com/office/drawing/2014/main" id="{75C6DFCB-BC27-4042-8DE5-4495E39FDB3B}"/>
+                </a:ext>
+              </a:extLst>
+            </p:cNvPr>
+            <p:cNvCxnSpPr>
+              <a:cxnSpLocks/>
+            </p:cNvCxnSpPr>
+            <p:nvPr/>
+          </p:nvCxnSpPr>
+          <p:spPr>
+            <a:xfrm rot="16200000">
+              <a:off x="1824567" y="6129867"/>
+              <a:ext cx="1028700" cy="0"/>
+            </a:xfrm>
+            <a:prstGeom prst="straightConnector1">
+              <a:avLst/>
+            </a:prstGeom>
+            <a:ln>
+              <a:tailEnd type="triangle"/>
+            </a:ln>
+          </p:spPr>
+          <p:style>
+            <a:lnRef idx="1">
+              <a:schemeClr val="accent1"/>
+            </a:lnRef>
+            <a:fillRef idx="0">
+              <a:schemeClr val="accent1"/>
+            </a:fillRef>
+            <a:effectRef idx="0">
+              <a:schemeClr val="accent1"/>
+            </a:effectRef>
+            <a:fontRef idx="minor">
+              <a:schemeClr val="tx1"/>
+            </a:fontRef>
+          </p:style>
+        </p:cxnSp>
+        <p:sp>
+          <p:nvSpPr>
+            <p:cNvPr id="46" name="TextBox 45">
+              <a:extLst>
+                <a:ext uri="{FF2B5EF4-FFF2-40B4-BE49-F238E27FC236}">
+                  <a16:creationId xmlns:a16="http://schemas.microsoft.com/office/drawing/2014/main" id="{1D3445C7-5290-4065-979E-CD5F8607CC64}"/>
+                </a:ext>
+              </a:extLst>
+            </p:cNvPr>
+            <p:cNvSpPr txBox="1"/>
+            <p:nvPr/>
+          </p:nvSpPr>
+          <p:spPr>
+            <a:xfrm>
+              <a:off x="1879602" y="5615517"/>
+              <a:ext cx="553998" cy="1028698"/>
+            </a:xfrm>
+            <a:prstGeom prst="rect">
+              <a:avLst/>
+            </a:prstGeom>
+            <a:noFill/>
+          </p:spPr>
+          <p:txBody>
+            <a:bodyPr vert="vert270" wrap="square" rtlCol="0">
+              <a:spAutoFit/>
+            </a:bodyPr>
+            <a:lstStyle/>
+            <a:p>
+              <a:pPr algn="ctr"/>
+              <a:r>
+                <a:rPr lang="en-US" sz="1200" i="1" dirty="0"/>
+                <a:t>r</a:t>
+              </a:r>
+              <a:r>
+                <a:rPr lang="en-US" sz="1200" dirty="0"/>
+                <a:t>=0.30</a:t>
+              </a:r>
+              <a:endParaRPr lang="en-US" sz="1200" i="1" dirty="0"/>
+            </a:p>
+            <a:p>
+              <a:pPr algn="ctr"/>
+              <a:r>
+                <a:rPr lang="en-US" sz="1200" i="1" dirty="0"/>
+                <a:t>b</a:t>
+              </a:r>
+            </a:p>
+          </p:txBody>
+        </p:sp>
+      </p:grpSp>
+      <p:grpSp>
+        <p:nvGrpSpPr>
+          <p:cNvPr id="47" name="Group 46">
+            <a:extLst>
+              <a:ext uri="{FF2B5EF4-FFF2-40B4-BE49-F238E27FC236}">
+                <a16:creationId xmlns:a16="http://schemas.microsoft.com/office/drawing/2014/main" id="{CC3A66A7-5D30-4E03-8418-F2A4E6B64888}"/>
+              </a:ext>
+            </a:extLst>
+          </p:cNvPr>
+          <p:cNvGrpSpPr/>
+          <p:nvPr/>
+        </p:nvGrpSpPr>
+        <p:grpSpPr>
+          <a:xfrm>
+            <a:off x="807756" y="1674833"/>
+            <a:ext cx="553998" cy="585113"/>
+            <a:chOff x="1879602" y="5615487"/>
+            <a:chExt cx="553998" cy="1028730"/>
+          </a:xfrm>
+        </p:grpSpPr>
+        <p:cxnSp>
+          <p:nvCxnSpPr>
+            <p:cNvPr id="48" name="Straight Arrow Connector 47">
+              <a:extLst>
+                <a:ext uri="{FF2B5EF4-FFF2-40B4-BE49-F238E27FC236}">
+                  <a16:creationId xmlns:a16="http://schemas.microsoft.com/office/drawing/2014/main" id="{F851001F-445F-4C84-B9DC-5A0B6C38CB44}"/>
+                </a:ext>
+              </a:extLst>
+            </p:cNvPr>
+            <p:cNvCxnSpPr>
+              <a:cxnSpLocks/>
+            </p:cNvCxnSpPr>
+            <p:nvPr/>
+          </p:nvCxnSpPr>
+          <p:spPr>
+            <a:xfrm rot="16200000">
+              <a:off x="1824567" y="6129867"/>
+              <a:ext cx="1028700" cy="0"/>
+            </a:xfrm>
+            <a:prstGeom prst="straightConnector1">
+              <a:avLst/>
+            </a:prstGeom>
+            <a:ln>
+              <a:tailEnd type="triangle"/>
+            </a:ln>
+          </p:spPr>
+          <p:style>
+            <a:lnRef idx="1">
+              <a:schemeClr val="accent1"/>
+            </a:lnRef>
+            <a:fillRef idx="0">
+              <a:schemeClr val="accent1"/>
+            </a:fillRef>
+            <a:effectRef idx="0">
+              <a:schemeClr val="accent1"/>
+            </a:effectRef>
+            <a:fontRef idx="minor">
+              <a:schemeClr val="tx1"/>
+            </a:fontRef>
+          </p:style>
+        </p:cxnSp>
+        <p:sp>
+          <p:nvSpPr>
+            <p:cNvPr id="49" name="TextBox 48">
+              <a:extLst>
+                <a:ext uri="{FF2B5EF4-FFF2-40B4-BE49-F238E27FC236}">
+                  <a16:creationId xmlns:a16="http://schemas.microsoft.com/office/drawing/2014/main" id="{7C01DCA1-8815-472B-A822-DF545939D263}"/>
+                </a:ext>
+              </a:extLst>
+            </p:cNvPr>
+            <p:cNvSpPr txBox="1"/>
+            <p:nvPr/>
+          </p:nvSpPr>
+          <p:spPr>
+            <a:xfrm>
+              <a:off x="1879602" y="5615487"/>
+              <a:ext cx="553998" cy="1028693"/>
+            </a:xfrm>
+            <a:prstGeom prst="rect">
+              <a:avLst/>
+            </a:prstGeom>
+            <a:noFill/>
+          </p:spPr>
+          <p:txBody>
+            <a:bodyPr vert="vert270" wrap="square" rtlCol="0">
+              <a:spAutoFit/>
+            </a:bodyPr>
+            <a:lstStyle/>
+            <a:p>
+              <a:pPr algn="ctr"/>
+              <a:r>
+                <a:rPr lang="en-US" sz="1200" i="1" dirty="0"/>
+                <a:t>r</a:t>
+              </a:r>
+              <a:r>
+                <a:rPr lang="en-US" sz="1200" dirty="0"/>
+                <a:t>=0.10</a:t>
+              </a:r>
+              <a:endParaRPr lang="en-US" sz="1200" i="1" dirty="0"/>
+            </a:p>
+            <a:p>
+              <a:pPr algn="ctr"/>
+              <a:r>
+                <a:rPr lang="en-US" sz="1200" i="1" dirty="0"/>
+                <a:t>b</a:t>
+              </a:r>
+            </a:p>
+          </p:txBody>
+        </p:sp>
+      </p:grpSp>
+      <p:grpSp>
+        <p:nvGrpSpPr>
+          <p:cNvPr id="50" name="Group 49">
+            <a:extLst>
+              <a:ext uri="{FF2B5EF4-FFF2-40B4-BE49-F238E27FC236}">
+                <a16:creationId xmlns:a16="http://schemas.microsoft.com/office/drawing/2014/main" id="{1009C8FE-6B48-4BE9-984A-4AF6BBBF44BD}"/>
+              </a:ext>
+            </a:extLst>
+          </p:cNvPr>
+          <p:cNvGrpSpPr/>
+          <p:nvPr/>
+        </p:nvGrpSpPr>
+        <p:grpSpPr>
+          <a:xfrm>
+            <a:off x="4311982" y="5722776"/>
+            <a:ext cx="1028701" cy="461665"/>
+            <a:chOff x="1824566" y="6032498"/>
+            <a:chExt cx="1028701" cy="461665"/>
+          </a:xfrm>
+        </p:grpSpPr>
+        <p:cxnSp>
+          <p:nvCxnSpPr>
+            <p:cNvPr id="51" name="Straight Arrow Connector 50">
+              <a:extLst>
+                <a:ext uri="{FF2B5EF4-FFF2-40B4-BE49-F238E27FC236}">
+                  <a16:creationId xmlns:a16="http://schemas.microsoft.com/office/drawing/2014/main" id="{672F3D2A-ED39-40D2-B9BB-83DAB6E03D80}"/>
+                </a:ext>
+              </a:extLst>
+            </p:cNvPr>
+            <p:cNvCxnSpPr/>
+            <p:nvPr/>
+          </p:nvCxnSpPr>
+          <p:spPr>
+            <a:xfrm>
+              <a:off x="1824567" y="6129867"/>
+              <a:ext cx="1028700" cy="0"/>
+            </a:xfrm>
+            <a:prstGeom prst="straightConnector1">
+              <a:avLst/>
+            </a:prstGeom>
+            <a:ln>
+              <a:tailEnd type="triangle"/>
+            </a:ln>
+          </p:spPr>
+          <p:style>
+            <a:lnRef idx="1">
+              <a:schemeClr val="accent1"/>
+            </a:lnRef>
+            <a:fillRef idx="0">
+              <a:schemeClr val="accent1"/>
+            </a:fillRef>
+            <a:effectRef idx="0">
+              <a:schemeClr val="accent1"/>
+            </a:effectRef>
+            <a:fontRef idx="minor">
+              <a:schemeClr val="tx1"/>
+            </a:fontRef>
+          </p:style>
+        </p:cxnSp>
+        <p:sp>
+          <p:nvSpPr>
+            <p:cNvPr id="52" name="TextBox 51">
+              <a:extLst>
+                <a:ext uri="{FF2B5EF4-FFF2-40B4-BE49-F238E27FC236}">
+                  <a16:creationId xmlns:a16="http://schemas.microsoft.com/office/drawing/2014/main" id="{DA048C9A-6420-46A7-A11D-63136774BEF3}"/>
+                </a:ext>
+              </a:extLst>
+            </p:cNvPr>
+            <p:cNvSpPr txBox="1"/>
+            <p:nvPr/>
+          </p:nvSpPr>
+          <p:spPr>
+            <a:xfrm>
+              <a:off x="1824566" y="6032498"/>
+              <a:ext cx="1024468" cy="461665"/>
+            </a:xfrm>
+            <a:prstGeom prst="rect">
+              <a:avLst/>
+            </a:prstGeom>
+            <a:noFill/>
+          </p:spPr>
+          <p:txBody>
+            <a:bodyPr wrap="square" rtlCol="0">
+              <a:spAutoFit/>
+            </a:bodyPr>
+            <a:lstStyle/>
+            <a:p>
+              <a:pPr algn="ctr"/>
+              <a:r>
+                <a:rPr lang="en-US" sz="1200" i="1" dirty="0"/>
+                <a:t>g</a:t>
+              </a:r>
+            </a:p>
+            <a:p>
+              <a:pPr algn="ctr"/>
+              <a:r>
+                <a:rPr lang="en-US" sz="1200" i="1" dirty="0"/>
+                <a:t>p</a:t>
+              </a:r>
+              <a:r>
+                <a:rPr lang="en-US" sz="1200" dirty="0"/>
+                <a:t>=0.30</a:t>
+              </a:r>
+            </a:p>
+          </p:txBody>
+        </p:sp>
+      </p:grpSp>
+      <p:pic>
+        <p:nvPicPr>
+          <p:cNvPr id="7" name="Picture 6" descr="Calendar&#10;&#10;Description automatically generated">
+            <a:extLst>
+              <a:ext uri="{FF2B5EF4-FFF2-40B4-BE49-F238E27FC236}">
+                <a16:creationId xmlns:a16="http://schemas.microsoft.com/office/drawing/2014/main" id="{2898A0A6-8B35-46B2-9C73-2B769C76E27C}"/>
+              </a:ext>
+            </a:extLst>
+          </p:cNvPr>
+          <p:cNvPicPr>
+            <a:picLocks noChangeAspect="1"/>
+          </p:cNvPicPr>
+          <p:nvPr/>
+        </p:nvPicPr>
+        <p:blipFill rotWithShape="1">
+          <a:blip r:embed="rId2">
+            <a:extLst>
+              <a:ext uri="{28A0092B-C50C-407E-A947-70E740481C1C}">
+                <a14:useLocalDpi xmlns:a14="http://schemas.microsoft.com/office/drawing/2010/main" val="0"/>
+              </a:ext>
+            </a:extLst>
+          </a:blip>
+          <a:srcRect l="4538" t="4776" r="1531" b="3753"/>
+          <a:stretch/>
+        </p:blipFill>
+        <p:spPr>
+          <a:xfrm>
+            <a:off x="1316193" y="1546966"/>
+            <a:ext cx="6755143" cy="4228826"/>
+          </a:xfrm>
+          <a:prstGeom prst="rect">
+            <a:avLst/>
+          </a:prstGeom>
+        </p:spPr>
+      </p:pic>
+    </p:spTree>
+    <p:extLst>
+      <p:ext uri="{BB962C8B-B14F-4D97-AF65-F5344CB8AC3E}">
+        <p14:creationId xmlns:p14="http://schemas.microsoft.com/office/powerpoint/2010/main" val="1151188242"/>
+      </p:ext>
+    </p:extLst>
+  </p:cSld>
+  <p:clrMapOvr>
+    <a:masterClrMapping/>
+  </p:clrMapOvr>
+</p:sld>
+</file>
+
+<file path=ppt/slides/slide5.xml><?xml version="1.0" encoding="utf-8"?>
+<p:sld xmlns:a="http://schemas.openxmlformats.org/drawingml/2006/main" xmlns:r="http://schemas.openxmlformats.org/officeDocument/2006/relationships" xmlns:p="http://schemas.openxmlformats.org/presentationml/2006/main">
+  <p:cSld>
+    <p:spTree>
+      <p:nvGrpSpPr>
+        <p:cNvPr id="1" name=""/>
+        <p:cNvGrpSpPr/>
+        <p:nvPr/>
+      </p:nvGrpSpPr>
+      <p:grpSpPr>
+        <a:xfrm>
+          <a:off x="0" y="0"/>
+          <a:ext cx="0" cy="0"/>
+          <a:chOff x="0" y="0"/>
+          <a:chExt cx="0" cy="0"/>
+        </a:xfrm>
+      </p:grpSpPr>
+      <p:sp>
+        <p:nvSpPr>
+          <p:cNvPr id="4" name="Title 3">
+            <a:extLst>
+              <a:ext uri="{FF2B5EF4-FFF2-40B4-BE49-F238E27FC236}">
+                <a16:creationId xmlns:a16="http://schemas.microsoft.com/office/drawing/2014/main" id="{EBC4ABCE-05FA-4150-AE99-F6545909F115}"/>
+              </a:ext>
+            </a:extLst>
+          </p:cNvPr>
+          <p:cNvSpPr>
+            <a:spLocks noGrp="1"/>
+          </p:cNvSpPr>
+          <p:nvPr>
+            <p:ph type="title"/>
+          </p:nvPr>
+        </p:nvSpPr>
+        <p:spPr/>
+        <p:txBody>
+          <a:bodyPr>
+            <a:normAutofit/>
+          </a:bodyPr>
+          <a:lstStyle/>
+          <a:p>
+            <a:r>
+              <a:rPr lang="en-US" sz="1200" b="1" dirty="0"/>
+              <a:t>Figure 2. </a:t>
+            </a:r>
+            <a:r>
+              <a:rPr lang="en-US" sz="1200" dirty="0"/>
               <a:t>Effects on equilibrium female share of the total applicant pool from gender differences in reapplication (g, horizontal axis) and the baseline reapplication rate (b, vertical axis) plotted as a contour plot. The female share of first-time applicants (p) in the figure is 0.30, or 30%. The rejection rate experienced by all applicants (r) in this figure is 0.70, or 70%. Each contour line in the panel represents a 1 percentage point change (0.01) from the initial female share of first-time applicants (p=0.30). </a:t>
             </a:r>
           </a:p>
@@ -3309,7 +6369,7 @@
     </p:spTree>
     <p:extLst>
       <p:ext uri="{BB962C8B-B14F-4D97-AF65-F5344CB8AC3E}">
-        <p14:creationId xmlns:p14="http://schemas.microsoft.com/office/powerpoint/2010/main" val="329367528"/>
+        <p14:creationId xmlns:p14="http://schemas.microsoft.com/office/powerpoint/2010/main" val="2021532856"/>
       </p:ext>
     </p:extLst>
   </p:cSld>
@@ -3319,7 +6379,7 @@
 </p:sld>
 </file>
 
-<file path=ppt/slides/slide2.xml><?xml version="1.0" encoding="utf-8"?>
+<file path=ppt/slides/slide6.xml><?xml version="1.0" encoding="utf-8"?>
 <p:sld xmlns:a="http://schemas.openxmlformats.org/drawingml/2006/main" xmlns:r="http://schemas.openxmlformats.org/officeDocument/2006/relationships" xmlns:p="http://schemas.openxmlformats.org/presentationml/2006/main">
   <p:cSld>
     <p:spTree>
@@ -4494,7 +7554,7 @@
     </p:spTree>
     <p:extLst>
       <p:ext uri="{BB962C8B-B14F-4D97-AF65-F5344CB8AC3E}">
-        <p14:creationId xmlns:p14="http://schemas.microsoft.com/office/powerpoint/2010/main" val="760396856"/>
+        <p14:creationId xmlns:p14="http://schemas.microsoft.com/office/powerpoint/2010/main" val="4267351181"/>
       </p:ext>
     </p:extLst>
   </p:cSld>
@@ -4504,7 +7564,7 @@
 </p:sld>
 </file>
 
-<file path=ppt/slides/slide3.xml><?xml version="1.0" encoding="utf-8"?>
+<file path=ppt/slides/slide7.xml><?xml version="1.0" encoding="utf-8"?>
 <p:sld xmlns:a="http://schemas.openxmlformats.org/drawingml/2006/main" xmlns:r="http://schemas.openxmlformats.org/officeDocument/2006/relationships" xmlns:p="http://schemas.openxmlformats.org/presentationml/2006/main">
   <p:cSld>
     <p:spTree>
@@ -4683,7 +7743,7 @@
     </p:spTree>
     <p:extLst>
       <p:ext uri="{BB962C8B-B14F-4D97-AF65-F5344CB8AC3E}">
-        <p14:creationId xmlns:p14="http://schemas.microsoft.com/office/powerpoint/2010/main" val="2110773135"/>
+        <p14:creationId xmlns:p14="http://schemas.microsoft.com/office/powerpoint/2010/main" val="2939542715"/>
       </p:ext>
     </p:extLst>
   </p:cSld>
@@ -4693,7 +7753,7 @@
 </p:sld>
 </file>
 
-<file path=ppt/slides/slide4.xml><?xml version="1.0" encoding="utf-8"?>
+<file path=ppt/slides/slide8.xml><?xml version="1.0" encoding="utf-8"?>
 <p:sld xmlns:a="http://schemas.openxmlformats.org/drawingml/2006/main" xmlns:r="http://schemas.openxmlformats.org/officeDocument/2006/relationships" xmlns:p="http://schemas.openxmlformats.org/presentationml/2006/main">
   <p:cSld>
     <p:spTree>
@@ -5974,7 +9034,7 @@
     </p:spTree>
     <p:extLst>
       <p:ext uri="{BB962C8B-B14F-4D97-AF65-F5344CB8AC3E}">
-        <p14:creationId xmlns:p14="http://schemas.microsoft.com/office/powerpoint/2010/main" val="1151188242"/>
+        <p14:creationId xmlns:p14="http://schemas.microsoft.com/office/powerpoint/2010/main" val="3933128609"/>
       </p:ext>
     </p:extLst>
   </p:cSld>
@@ -6246,21 +9306,6 @@
 </file>
 
 <file path=customXml/item1.xml><?xml version="1.0" encoding="utf-8"?>
-<p:properties xmlns:p="http://schemas.microsoft.com/office/2006/metadata/properties" xmlns:xsi="http://www.w3.org/2001/XMLSchema-instance" xmlns:pc="http://schemas.microsoft.com/office/infopath/2007/PartnerControls">
-  <documentManagement/>
-</p:properties>
-</file>
-
-<file path=customXml/item2.xml><?xml version="1.0" encoding="utf-8"?>
-<?mso-contentType ?>
-<FormTemplates xmlns="http://schemas.microsoft.com/sharepoint/v3/contenttype/forms">
-  <Display>DocumentLibraryForm</Display>
-  <Edit>DocumentLibraryForm</Edit>
-  <New>DocumentLibraryForm</New>
-</FormTemplates>
-</file>
-
-<file path=customXml/item3.xml><?xml version="1.0" encoding="utf-8"?>
 <ct:contentTypeSchema xmlns:ct="http://schemas.microsoft.com/office/2006/metadata/contentType" xmlns:ma="http://schemas.microsoft.com/office/2006/metadata/properties/metaAttributes" ct:_="" ma:_="" ma:contentTypeName="Document" ma:contentTypeID="0x010100A0C705D902B8F64CAAF02653EF81F96A" ma:contentTypeVersion="15" ma:contentTypeDescription="Create a new document." ma:contentTypeScope="" ma:versionID="e85ae2bf280e7931939e5edb77f424fe">
   <xsd:schema xmlns:xsd="http://www.w3.org/2001/XMLSchema" xmlns:xs="http://www.w3.org/2001/XMLSchema" xmlns:p="http://schemas.microsoft.com/office/2006/metadata/properties" xmlns:ns3="50d52fa3-2d4f-4d98-80c2-cb68fcf96e06" xmlns:ns4="c8386d2e-91e1-414a-9b55-bdf3a933a2ad" targetNamespace="http://schemas.microsoft.com/office/2006/metadata/properties" ma:root="true" ma:fieldsID="593bc4ba48c9a954e89662f0bb31e6b7" ns3:_="" ns4:_="">
     <xsd:import namespace="50d52fa3-2d4f-4d98-80c2-cb68fcf96e06"/>
@@ -6497,24 +9542,22 @@
 </ct:contentTypeSchema>
 </file>
 
-<file path=customXml/itemProps1.xml><?xml version="1.0" encoding="utf-8"?>
-<ds:datastoreItem xmlns:ds="http://schemas.openxmlformats.org/officeDocument/2006/customXml" ds:itemID="{C12DE22F-D1CC-4F65-BDA8-91C99FBD566D}">
-  <ds:schemaRefs>
-    <ds:schemaRef ds:uri="http://schemas.microsoft.com/office/2006/metadata/properties"/>
-    <ds:schemaRef ds:uri="http://schemas.microsoft.com/office/infopath/2007/PartnerControls"/>
-  </ds:schemaRefs>
-</ds:datastoreItem>
+<file path=customXml/item2.xml><?xml version="1.0" encoding="utf-8"?>
+<?mso-contentType ?>
+<FormTemplates xmlns="http://schemas.microsoft.com/sharepoint/v3/contenttype/forms">
+  <Display>DocumentLibraryForm</Display>
+  <Edit>DocumentLibraryForm</Edit>
+  <New>DocumentLibraryForm</New>
+</FormTemplates>
 </file>
 
-<file path=customXml/itemProps2.xml><?xml version="1.0" encoding="utf-8"?>
-<ds:datastoreItem xmlns:ds="http://schemas.openxmlformats.org/officeDocument/2006/customXml" ds:itemID="{4176F748-4E36-4C88-9EC3-2C6019768886}">
-  <ds:schemaRefs>
-    <ds:schemaRef ds:uri="http://schemas.microsoft.com/sharepoint/v3/contenttype/forms"/>
-  </ds:schemaRefs>
-</ds:datastoreItem>
+<file path=customXml/item3.xml><?xml version="1.0" encoding="utf-8"?>
+<p:properties xmlns:p="http://schemas.microsoft.com/office/2006/metadata/properties" xmlns:xsi="http://www.w3.org/2001/XMLSchema-instance" xmlns:pc="http://schemas.microsoft.com/office/infopath/2007/PartnerControls">
+  <documentManagement/>
+</p:properties>
 </file>
 
-<file path=customXml/itemProps3.xml><?xml version="1.0" encoding="utf-8"?>
+<file path=customXml/itemProps1.xml><?xml version="1.0" encoding="utf-8"?>
 <ds:datastoreItem xmlns:ds="http://schemas.openxmlformats.org/officeDocument/2006/customXml" ds:itemID="{8486E7BC-F911-4829-9AD9-F7F985B1A628}">
   <ds:schemaRefs>
     <ds:schemaRef ds:uri="http://schemas.microsoft.com/office/2006/metadata/contentType"/>
@@ -6531,4 +9574,21 @@
     <ds:schemaRef ds:uri="http://schemas.microsoft.com/internal/obd"/>
   </ds:schemaRefs>
 </ds:datastoreItem>
+</file>
+
+<file path=customXml/itemProps2.xml><?xml version="1.0" encoding="utf-8"?>
+<ds:datastoreItem xmlns:ds="http://schemas.openxmlformats.org/officeDocument/2006/customXml" ds:itemID="{4176F748-4E36-4C88-9EC3-2C6019768886}">
+  <ds:schemaRefs>
+    <ds:schemaRef ds:uri="http://schemas.microsoft.com/sharepoint/v3/contenttype/forms"/>
+  </ds:schemaRefs>
+</ds:datastoreItem>
+</file>
+
+<file path=customXml/itemProps3.xml><?xml version="1.0" encoding="utf-8"?>
+<ds:datastoreItem xmlns:ds="http://schemas.openxmlformats.org/officeDocument/2006/customXml" ds:itemID="{C12DE22F-D1CC-4F65-BDA8-91C99FBD566D}">
+  <ds:schemaRefs>
+    <ds:schemaRef ds:uri="http://schemas.microsoft.com/office/2006/metadata/properties"/>
+    <ds:schemaRef ds:uri="http://schemas.microsoft.com/office/infopath/2007/PartnerControls"/>
+  </ds:schemaRefs>
+</ds:datastoreItem>
 </file>
</xml_diff>